<commit_message>
Disciplina CLP LADDER 2Mar2025
</commit_message>
<xml_diff>
--- a/01 Classes/Aula3 - CLP - Programação - Linguagem LADER.pptx
+++ b/01 Classes/Aula3 - CLP - Programação - Linguagem LADER.pptx
@@ -5,7 +5,7 @@
     <p:sldMasterId id="2147483648" r:id="rId1"/>
   </p:sldMasterIdLst>
   <p:notesMasterIdLst>
-    <p:notesMasterId r:id="rId42"/>
+    <p:notesMasterId r:id="rId41"/>
   </p:notesMasterIdLst>
   <p:sldIdLst>
     <p:sldId id="256" r:id="rId2"/>
@@ -28,26 +28,25 @@
     <p:sldId id="362" r:id="rId19"/>
     <p:sldId id="367" r:id="rId20"/>
     <p:sldId id="368" r:id="rId21"/>
-    <p:sldId id="371" r:id="rId22"/>
-    <p:sldId id="369" r:id="rId23"/>
-    <p:sldId id="372" r:id="rId24"/>
-    <p:sldId id="370" r:id="rId25"/>
-    <p:sldId id="373" r:id="rId26"/>
-    <p:sldId id="363" r:id="rId27"/>
-    <p:sldId id="364" r:id="rId28"/>
-    <p:sldId id="366" r:id="rId29"/>
-    <p:sldId id="374" r:id="rId30"/>
-    <p:sldId id="375" r:id="rId31"/>
-    <p:sldId id="377" r:id="rId32"/>
-    <p:sldId id="378" r:id="rId33"/>
-    <p:sldId id="376" r:id="rId34"/>
-    <p:sldId id="379" r:id="rId35"/>
-    <p:sldId id="380" r:id="rId36"/>
-    <p:sldId id="333" r:id="rId37"/>
-    <p:sldId id="323" r:id="rId38"/>
-    <p:sldId id="360" r:id="rId39"/>
-    <p:sldId id="337" r:id="rId40"/>
-    <p:sldId id="309" r:id="rId41"/>
+    <p:sldId id="369" r:id="rId22"/>
+    <p:sldId id="372" r:id="rId23"/>
+    <p:sldId id="370" r:id="rId24"/>
+    <p:sldId id="373" r:id="rId25"/>
+    <p:sldId id="363" r:id="rId26"/>
+    <p:sldId id="364" r:id="rId27"/>
+    <p:sldId id="366" r:id="rId28"/>
+    <p:sldId id="374" r:id="rId29"/>
+    <p:sldId id="375" r:id="rId30"/>
+    <p:sldId id="377" r:id="rId31"/>
+    <p:sldId id="378" r:id="rId32"/>
+    <p:sldId id="376" r:id="rId33"/>
+    <p:sldId id="379" r:id="rId34"/>
+    <p:sldId id="380" r:id="rId35"/>
+    <p:sldId id="333" r:id="rId36"/>
+    <p:sldId id="323" r:id="rId37"/>
+    <p:sldId id="360" r:id="rId38"/>
+    <p:sldId id="337" r:id="rId39"/>
+    <p:sldId id="309" r:id="rId40"/>
   </p:sldIdLst>
   <p:sldSz cx="9144000" cy="5143500" type="screen16x9"/>
   <p:notesSz cx="6858000" cy="9144000"/>
@@ -1526,90 +1525,6 @@
         <p:cNvPr id="1" name="">
           <a:extLst>
             <a:ext uri="{FF2B5EF4-FFF2-40B4-BE49-F238E27FC236}">
-              <a16:creationId xmlns:a16="http://schemas.microsoft.com/office/drawing/2014/main" id="{EB2D935A-B58A-4367-B0DF-5D82F95EF287}"/>
-            </a:ext>
-          </a:extLst>
-        </p:cNvPr>
-        <p:cNvGrpSpPr/>
-        <p:nvPr/>
-      </p:nvGrpSpPr>
-      <p:grpSpPr>
-        <a:xfrm>
-          <a:off x="0" y="0"/>
-          <a:ext cx="0" cy="0"/>
-          <a:chOff x="0" y="0"/>
-          <a:chExt cx="0" cy="0"/>
-        </a:xfrm>
-      </p:grpSpPr>
-      <p:sp>
-        <p:nvSpPr>
-          <p:cNvPr id="2" name="Espaço Reservado para Imagem de Slide 1">
-            <a:extLst>
-              <a:ext uri="{FF2B5EF4-FFF2-40B4-BE49-F238E27FC236}">
-                <a16:creationId xmlns:a16="http://schemas.microsoft.com/office/drawing/2014/main" id="{63998CC0-822E-ED53-6003-F82292CBBFCA}"/>
-              </a:ext>
-            </a:extLst>
-          </p:cNvPr>
-          <p:cNvSpPr>
-            <a:spLocks noGrp="1" noRot="1" noChangeAspect="1"/>
-          </p:cNvSpPr>
-          <p:nvPr>
-            <p:ph type="sldImg"/>
-          </p:nvPr>
-        </p:nvSpPr>
-        <p:spPr>
-          <a:xfrm>
-            <a:off x="381000" y="685800"/>
-            <a:ext cx="6096000" cy="3429000"/>
-          </a:xfrm>
-        </p:spPr>
-      </p:sp>
-      <p:sp>
-        <p:nvSpPr>
-          <p:cNvPr id="3" name="Espaço Reservado para Anotações 2">
-            <a:extLst>
-              <a:ext uri="{FF2B5EF4-FFF2-40B4-BE49-F238E27FC236}">
-                <a16:creationId xmlns:a16="http://schemas.microsoft.com/office/drawing/2014/main" id="{AE95660F-8821-0504-5BB0-14FCD5B8BDA3}"/>
-              </a:ext>
-            </a:extLst>
-          </p:cNvPr>
-          <p:cNvSpPr>
-            <a:spLocks noGrp="1"/>
-          </p:cNvSpPr>
-          <p:nvPr>
-            <p:ph type="body" idx="1"/>
-          </p:nvPr>
-        </p:nvSpPr>
-        <p:spPr/>
-        <p:txBody>
-          <a:bodyPr/>
-          <a:lstStyle/>
-          <a:p>
-            <a:endParaRPr lang="pt-BR" dirty="0"/>
-          </a:p>
-        </p:txBody>
-      </p:sp>
-    </p:spTree>
-    <p:extLst>
-      <p:ext uri="{BB962C8B-B14F-4D97-AF65-F5344CB8AC3E}">
-        <p14:creationId xmlns:p14="http://schemas.microsoft.com/office/powerpoint/2010/main" val="4079448964"/>
-      </p:ext>
-    </p:extLst>
-  </p:cSld>
-  <p:clrMapOvr>
-    <a:masterClrMapping/>
-  </p:clrMapOvr>
-</p:notes>
-</file>
-
-<file path=ppt/notesSlides/notesSlide21.xml><?xml version="1.0" encoding="utf-8"?>
-<p:notes xmlns:a="http://schemas.openxmlformats.org/drawingml/2006/main" xmlns:r="http://schemas.openxmlformats.org/officeDocument/2006/relationships" xmlns:p="http://schemas.openxmlformats.org/presentationml/2006/main">
-  <p:cSld>
-    <p:spTree>
-      <p:nvGrpSpPr>
-        <p:cNvPr id="1" name="">
-          <a:extLst>
-            <a:ext uri="{FF2B5EF4-FFF2-40B4-BE49-F238E27FC236}">
               <a16:creationId xmlns:a16="http://schemas.microsoft.com/office/drawing/2014/main" id="{6C7F3E01-2C51-9E11-70BF-99B57F8A115E}"/>
             </a:ext>
           </a:extLst>
@@ -1686,7 +1601,7 @@
 </p:notes>
 </file>
 
-<file path=ppt/notesSlides/notesSlide22.xml><?xml version="1.0" encoding="utf-8"?>
+<file path=ppt/notesSlides/notesSlide21.xml><?xml version="1.0" encoding="utf-8"?>
 <p:notes xmlns:a="http://schemas.openxmlformats.org/drawingml/2006/main" xmlns:r="http://schemas.openxmlformats.org/officeDocument/2006/relationships" xmlns:p="http://schemas.openxmlformats.org/presentationml/2006/main">
   <p:cSld>
     <p:spTree>
@@ -1770,7 +1685,7 @@
 </p:notes>
 </file>
 
-<file path=ppt/notesSlides/notesSlide23.xml><?xml version="1.0" encoding="utf-8"?>
+<file path=ppt/notesSlides/notesSlide22.xml><?xml version="1.0" encoding="utf-8"?>
 <p:notes xmlns:a="http://schemas.openxmlformats.org/drawingml/2006/main" xmlns:r="http://schemas.openxmlformats.org/officeDocument/2006/relationships" xmlns:p="http://schemas.openxmlformats.org/presentationml/2006/main">
   <p:cSld>
     <p:spTree>
@@ -1854,7 +1769,7 @@
 </p:notes>
 </file>
 
-<file path=ppt/notesSlides/notesSlide24.xml><?xml version="1.0" encoding="utf-8"?>
+<file path=ppt/notesSlides/notesSlide23.xml><?xml version="1.0" encoding="utf-8"?>
 <p:notes xmlns:a="http://schemas.openxmlformats.org/drawingml/2006/main" xmlns:r="http://schemas.openxmlformats.org/officeDocument/2006/relationships" xmlns:p="http://schemas.openxmlformats.org/presentationml/2006/main">
   <p:cSld>
     <p:spTree>
@@ -1938,7 +1853,7 @@
 </p:notes>
 </file>
 
-<file path=ppt/notesSlides/notesSlide25.xml><?xml version="1.0" encoding="utf-8"?>
+<file path=ppt/notesSlides/notesSlide24.xml><?xml version="1.0" encoding="utf-8"?>
 <p:notes xmlns:a="http://schemas.openxmlformats.org/drawingml/2006/main" xmlns:r="http://schemas.openxmlformats.org/officeDocument/2006/relationships" xmlns:p="http://schemas.openxmlformats.org/presentationml/2006/main">
   <p:cSld>
     <p:spTree>
@@ -2022,7 +1937,7 @@
 </p:notes>
 </file>
 
-<file path=ppt/notesSlides/notesSlide26.xml><?xml version="1.0" encoding="utf-8"?>
+<file path=ppt/notesSlides/notesSlide25.xml><?xml version="1.0" encoding="utf-8"?>
 <p:notes xmlns:a="http://schemas.openxmlformats.org/drawingml/2006/main" xmlns:r="http://schemas.openxmlformats.org/officeDocument/2006/relationships" xmlns:p="http://schemas.openxmlformats.org/presentationml/2006/main">
   <p:cSld>
     <p:spTree>
@@ -2106,7 +2021,7 @@
 </p:notes>
 </file>
 
-<file path=ppt/notesSlides/notesSlide27.xml><?xml version="1.0" encoding="utf-8"?>
+<file path=ppt/notesSlides/notesSlide26.xml><?xml version="1.0" encoding="utf-8"?>
 <p:notes xmlns:a="http://schemas.openxmlformats.org/drawingml/2006/main" xmlns:r="http://schemas.openxmlformats.org/officeDocument/2006/relationships" xmlns:p="http://schemas.openxmlformats.org/presentationml/2006/main">
   <p:cSld>
     <p:spTree>
@@ -2190,7 +2105,7 @@
 </p:notes>
 </file>
 
-<file path=ppt/notesSlides/notesSlide28.xml><?xml version="1.0" encoding="utf-8"?>
+<file path=ppt/notesSlides/notesSlide27.xml><?xml version="1.0" encoding="utf-8"?>
 <p:notes xmlns:a="http://schemas.openxmlformats.org/drawingml/2006/main" xmlns:r="http://schemas.openxmlformats.org/officeDocument/2006/relationships" xmlns:p="http://schemas.openxmlformats.org/presentationml/2006/main">
   <p:cSld>
     <p:spTree>
@@ -2274,7 +2189,7 @@
 </p:notes>
 </file>
 
-<file path=ppt/notesSlides/notesSlide29.xml><?xml version="1.0" encoding="utf-8"?>
+<file path=ppt/notesSlides/notesSlide28.xml><?xml version="1.0" encoding="utf-8"?>
 <p:notes xmlns:a="http://schemas.openxmlformats.org/drawingml/2006/main" xmlns:r="http://schemas.openxmlformats.org/officeDocument/2006/relationships" xmlns:p="http://schemas.openxmlformats.org/presentationml/2006/main">
   <p:cSld>
     <p:spTree>
@@ -2349,6 +2264,90 @@
     <p:extLst>
       <p:ext uri="{BB962C8B-B14F-4D97-AF65-F5344CB8AC3E}">
         <p14:creationId xmlns:p14="http://schemas.microsoft.com/office/powerpoint/2010/main" val="2234302071"/>
+      </p:ext>
+    </p:extLst>
+  </p:cSld>
+  <p:clrMapOvr>
+    <a:masterClrMapping/>
+  </p:clrMapOvr>
+</p:notes>
+</file>
+
+<file path=ppt/notesSlides/notesSlide29.xml><?xml version="1.0" encoding="utf-8"?>
+<p:notes xmlns:a="http://schemas.openxmlformats.org/drawingml/2006/main" xmlns:r="http://schemas.openxmlformats.org/officeDocument/2006/relationships" xmlns:p="http://schemas.openxmlformats.org/presentationml/2006/main">
+  <p:cSld>
+    <p:spTree>
+      <p:nvGrpSpPr>
+        <p:cNvPr id="1" name="">
+          <a:extLst>
+            <a:ext uri="{FF2B5EF4-FFF2-40B4-BE49-F238E27FC236}">
+              <a16:creationId xmlns:a16="http://schemas.microsoft.com/office/drawing/2014/main" id="{DA44D9E7-9333-D14C-7C45-80F330EED851}"/>
+            </a:ext>
+          </a:extLst>
+        </p:cNvPr>
+        <p:cNvGrpSpPr/>
+        <p:nvPr/>
+      </p:nvGrpSpPr>
+      <p:grpSpPr>
+        <a:xfrm>
+          <a:off x="0" y="0"/>
+          <a:ext cx="0" cy="0"/>
+          <a:chOff x="0" y="0"/>
+          <a:chExt cx="0" cy="0"/>
+        </a:xfrm>
+      </p:grpSpPr>
+      <p:sp>
+        <p:nvSpPr>
+          <p:cNvPr id="2" name="Espaço Reservado para Imagem de Slide 1">
+            <a:extLst>
+              <a:ext uri="{FF2B5EF4-FFF2-40B4-BE49-F238E27FC236}">
+                <a16:creationId xmlns:a16="http://schemas.microsoft.com/office/drawing/2014/main" id="{AF3AFED8-387D-1372-A9CC-B023C5A182DF}"/>
+              </a:ext>
+            </a:extLst>
+          </p:cNvPr>
+          <p:cNvSpPr>
+            <a:spLocks noGrp="1" noRot="1" noChangeAspect="1"/>
+          </p:cNvSpPr>
+          <p:nvPr>
+            <p:ph type="sldImg"/>
+          </p:nvPr>
+        </p:nvSpPr>
+        <p:spPr>
+          <a:xfrm>
+            <a:off x="381000" y="685800"/>
+            <a:ext cx="6096000" cy="3429000"/>
+          </a:xfrm>
+        </p:spPr>
+      </p:sp>
+      <p:sp>
+        <p:nvSpPr>
+          <p:cNvPr id="3" name="Espaço Reservado para Anotações 2">
+            <a:extLst>
+              <a:ext uri="{FF2B5EF4-FFF2-40B4-BE49-F238E27FC236}">
+                <a16:creationId xmlns:a16="http://schemas.microsoft.com/office/drawing/2014/main" id="{6EF50B90-EAD5-E791-EC0E-8087C0717414}"/>
+              </a:ext>
+            </a:extLst>
+          </p:cNvPr>
+          <p:cNvSpPr>
+            <a:spLocks noGrp="1"/>
+          </p:cNvSpPr>
+          <p:nvPr>
+            <p:ph type="body" idx="1"/>
+          </p:nvPr>
+        </p:nvSpPr>
+        <p:spPr/>
+        <p:txBody>
+          <a:bodyPr/>
+          <a:lstStyle/>
+          <a:p>
+            <a:endParaRPr lang="pt-BR" dirty="0"/>
+          </a:p>
+        </p:txBody>
+      </p:sp>
+    </p:spTree>
+    <p:extLst>
+      <p:ext uri="{BB962C8B-B14F-4D97-AF65-F5344CB8AC3E}">
+        <p14:creationId xmlns:p14="http://schemas.microsoft.com/office/powerpoint/2010/main" val="959398365"/>
       </p:ext>
     </p:extLst>
   </p:cSld>
@@ -2450,90 +2449,6 @@
         <p:cNvPr id="1" name="">
           <a:extLst>
             <a:ext uri="{FF2B5EF4-FFF2-40B4-BE49-F238E27FC236}">
-              <a16:creationId xmlns:a16="http://schemas.microsoft.com/office/drawing/2014/main" id="{DA44D9E7-9333-D14C-7C45-80F330EED851}"/>
-            </a:ext>
-          </a:extLst>
-        </p:cNvPr>
-        <p:cNvGrpSpPr/>
-        <p:nvPr/>
-      </p:nvGrpSpPr>
-      <p:grpSpPr>
-        <a:xfrm>
-          <a:off x="0" y="0"/>
-          <a:ext cx="0" cy="0"/>
-          <a:chOff x="0" y="0"/>
-          <a:chExt cx="0" cy="0"/>
-        </a:xfrm>
-      </p:grpSpPr>
-      <p:sp>
-        <p:nvSpPr>
-          <p:cNvPr id="2" name="Espaço Reservado para Imagem de Slide 1">
-            <a:extLst>
-              <a:ext uri="{FF2B5EF4-FFF2-40B4-BE49-F238E27FC236}">
-                <a16:creationId xmlns:a16="http://schemas.microsoft.com/office/drawing/2014/main" id="{AF3AFED8-387D-1372-A9CC-B023C5A182DF}"/>
-              </a:ext>
-            </a:extLst>
-          </p:cNvPr>
-          <p:cNvSpPr>
-            <a:spLocks noGrp="1" noRot="1" noChangeAspect="1"/>
-          </p:cNvSpPr>
-          <p:nvPr>
-            <p:ph type="sldImg"/>
-          </p:nvPr>
-        </p:nvSpPr>
-        <p:spPr>
-          <a:xfrm>
-            <a:off x="381000" y="685800"/>
-            <a:ext cx="6096000" cy="3429000"/>
-          </a:xfrm>
-        </p:spPr>
-      </p:sp>
-      <p:sp>
-        <p:nvSpPr>
-          <p:cNvPr id="3" name="Espaço Reservado para Anotações 2">
-            <a:extLst>
-              <a:ext uri="{FF2B5EF4-FFF2-40B4-BE49-F238E27FC236}">
-                <a16:creationId xmlns:a16="http://schemas.microsoft.com/office/drawing/2014/main" id="{6EF50B90-EAD5-E791-EC0E-8087C0717414}"/>
-              </a:ext>
-            </a:extLst>
-          </p:cNvPr>
-          <p:cNvSpPr>
-            <a:spLocks noGrp="1"/>
-          </p:cNvSpPr>
-          <p:nvPr>
-            <p:ph type="body" idx="1"/>
-          </p:nvPr>
-        </p:nvSpPr>
-        <p:spPr/>
-        <p:txBody>
-          <a:bodyPr/>
-          <a:lstStyle/>
-          <a:p>
-            <a:endParaRPr lang="pt-BR" dirty="0"/>
-          </a:p>
-        </p:txBody>
-      </p:sp>
-    </p:spTree>
-    <p:extLst>
-      <p:ext uri="{BB962C8B-B14F-4D97-AF65-F5344CB8AC3E}">
-        <p14:creationId xmlns:p14="http://schemas.microsoft.com/office/powerpoint/2010/main" val="959398365"/>
-      </p:ext>
-    </p:extLst>
-  </p:cSld>
-  <p:clrMapOvr>
-    <a:masterClrMapping/>
-  </p:clrMapOvr>
-</p:notes>
-</file>
-
-<file path=ppt/notesSlides/notesSlide31.xml><?xml version="1.0" encoding="utf-8"?>
-<p:notes xmlns:a="http://schemas.openxmlformats.org/drawingml/2006/main" xmlns:r="http://schemas.openxmlformats.org/officeDocument/2006/relationships" xmlns:p="http://schemas.openxmlformats.org/presentationml/2006/main">
-  <p:cSld>
-    <p:spTree>
-      <p:nvGrpSpPr>
-        <p:cNvPr id="1" name="">
-          <a:extLst>
-            <a:ext uri="{FF2B5EF4-FFF2-40B4-BE49-F238E27FC236}">
               <a16:creationId xmlns:a16="http://schemas.microsoft.com/office/drawing/2014/main" id="{C0B32EA3-8058-3978-0B73-A93266778CD0}"/>
             </a:ext>
           </a:extLst>
@@ -2610,7 +2525,7 @@
 </p:notes>
 </file>
 
-<file path=ppt/notesSlides/notesSlide32.xml><?xml version="1.0" encoding="utf-8"?>
+<file path=ppt/notesSlides/notesSlide31.xml><?xml version="1.0" encoding="utf-8"?>
 <p:notes xmlns:a="http://schemas.openxmlformats.org/drawingml/2006/main" xmlns:r="http://schemas.openxmlformats.org/officeDocument/2006/relationships" xmlns:p="http://schemas.openxmlformats.org/presentationml/2006/main">
   <p:cSld>
     <p:spTree>
@@ -2694,7 +2609,7 @@
 </p:notes>
 </file>
 
-<file path=ppt/notesSlides/notesSlide33.xml><?xml version="1.0" encoding="utf-8"?>
+<file path=ppt/notesSlides/notesSlide32.xml><?xml version="1.0" encoding="utf-8"?>
 <p:notes xmlns:a="http://schemas.openxmlformats.org/drawingml/2006/main" xmlns:r="http://schemas.openxmlformats.org/officeDocument/2006/relationships" xmlns:p="http://schemas.openxmlformats.org/presentationml/2006/main">
   <p:cSld>
     <p:spTree>
@@ -2778,7 +2693,7 @@
 </p:notes>
 </file>
 
-<file path=ppt/notesSlides/notesSlide34.xml><?xml version="1.0" encoding="utf-8"?>
+<file path=ppt/notesSlides/notesSlide33.xml><?xml version="1.0" encoding="utf-8"?>
 <p:notes xmlns:a="http://schemas.openxmlformats.org/drawingml/2006/main" xmlns:r="http://schemas.openxmlformats.org/officeDocument/2006/relationships" xmlns:p="http://schemas.openxmlformats.org/presentationml/2006/main">
   <p:cSld>
     <p:spTree>
@@ -2862,6 +2777,72 @@
 </p:notes>
 </file>
 
+<file path=ppt/notesSlides/notesSlide34.xml><?xml version="1.0" encoding="utf-8"?>
+<p:notes xmlns:a="http://schemas.openxmlformats.org/drawingml/2006/main" xmlns:r="http://schemas.openxmlformats.org/officeDocument/2006/relationships" xmlns:p="http://schemas.openxmlformats.org/presentationml/2006/main">
+  <p:cSld>
+    <p:spTree>
+      <p:nvGrpSpPr>
+        <p:cNvPr id="1" name=""/>
+        <p:cNvGrpSpPr/>
+        <p:nvPr/>
+      </p:nvGrpSpPr>
+      <p:grpSpPr>
+        <a:xfrm>
+          <a:off x="0" y="0"/>
+          <a:ext cx="0" cy="0"/>
+          <a:chOff x="0" y="0"/>
+          <a:chExt cx="0" cy="0"/>
+        </a:xfrm>
+      </p:grpSpPr>
+      <p:sp>
+        <p:nvSpPr>
+          <p:cNvPr id="2" name="Espaço Reservado para Imagem de Slide 1"/>
+          <p:cNvSpPr>
+            <a:spLocks noGrp="1" noRot="1" noChangeAspect="1"/>
+          </p:cNvSpPr>
+          <p:nvPr>
+            <p:ph type="sldImg"/>
+          </p:nvPr>
+        </p:nvSpPr>
+        <p:spPr>
+          <a:xfrm>
+            <a:off x="381000" y="685800"/>
+            <a:ext cx="6096000" cy="3429000"/>
+          </a:xfrm>
+        </p:spPr>
+      </p:sp>
+      <p:sp>
+        <p:nvSpPr>
+          <p:cNvPr id="3" name="Espaço Reservado para Anotações 2"/>
+          <p:cNvSpPr>
+            <a:spLocks noGrp="1"/>
+          </p:cNvSpPr>
+          <p:nvPr>
+            <p:ph type="body" idx="1"/>
+          </p:nvPr>
+        </p:nvSpPr>
+        <p:spPr/>
+        <p:txBody>
+          <a:bodyPr/>
+          <a:lstStyle/>
+          <a:p>
+            <a:endParaRPr lang="pt-BR" dirty="0"/>
+          </a:p>
+        </p:txBody>
+      </p:sp>
+    </p:spTree>
+    <p:extLst>
+      <p:ext uri="{BB962C8B-B14F-4D97-AF65-F5344CB8AC3E}">
+        <p14:creationId xmlns:p14="http://schemas.microsoft.com/office/powerpoint/2010/main" val="585304384"/>
+      </p:ext>
+    </p:extLst>
+  </p:cSld>
+  <p:clrMapOvr>
+    <a:masterClrMapping/>
+  </p:clrMapOvr>
+</p:notes>
+</file>
+
 <file path=ppt/notesSlides/notesSlide35.xml><?xml version="1.0" encoding="utf-8"?>
 <p:notes xmlns:a="http://schemas.openxmlformats.org/drawingml/2006/main" xmlns:r="http://schemas.openxmlformats.org/officeDocument/2006/relationships" xmlns:p="http://schemas.openxmlformats.org/presentationml/2006/main">
   <p:cSld>
@@ -2918,7 +2899,7 @@
     </p:spTree>
     <p:extLst>
       <p:ext uri="{BB962C8B-B14F-4D97-AF65-F5344CB8AC3E}">
-        <p14:creationId xmlns:p14="http://schemas.microsoft.com/office/powerpoint/2010/main" val="585304384"/>
+        <p14:creationId xmlns:p14="http://schemas.microsoft.com/office/powerpoint/2010/main" val="2709569597"/>
       </p:ext>
     </p:extLst>
   </p:cSld>
@@ -2929,72 +2910,6 @@
 </file>
 
 <file path=ppt/notesSlides/notesSlide36.xml><?xml version="1.0" encoding="utf-8"?>
-<p:notes xmlns:a="http://schemas.openxmlformats.org/drawingml/2006/main" xmlns:r="http://schemas.openxmlformats.org/officeDocument/2006/relationships" xmlns:p="http://schemas.openxmlformats.org/presentationml/2006/main">
-  <p:cSld>
-    <p:spTree>
-      <p:nvGrpSpPr>
-        <p:cNvPr id="1" name=""/>
-        <p:cNvGrpSpPr/>
-        <p:nvPr/>
-      </p:nvGrpSpPr>
-      <p:grpSpPr>
-        <a:xfrm>
-          <a:off x="0" y="0"/>
-          <a:ext cx="0" cy="0"/>
-          <a:chOff x="0" y="0"/>
-          <a:chExt cx="0" cy="0"/>
-        </a:xfrm>
-      </p:grpSpPr>
-      <p:sp>
-        <p:nvSpPr>
-          <p:cNvPr id="2" name="Espaço Reservado para Imagem de Slide 1"/>
-          <p:cNvSpPr>
-            <a:spLocks noGrp="1" noRot="1" noChangeAspect="1"/>
-          </p:cNvSpPr>
-          <p:nvPr>
-            <p:ph type="sldImg"/>
-          </p:nvPr>
-        </p:nvSpPr>
-        <p:spPr>
-          <a:xfrm>
-            <a:off x="381000" y="685800"/>
-            <a:ext cx="6096000" cy="3429000"/>
-          </a:xfrm>
-        </p:spPr>
-      </p:sp>
-      <p:sp>
-        <p:nvSpPr>
-          <p:cNvPr id="3" name="Espaço Reservado para Anotações 2"/>
-          <p:cNvSpPr>
-            <a:spLocks noGrp="1"/>
-          </p:cNvSpPr>
-          <p:nvPr>
-            <p:ph type="body" idx="1"/>
-          </p:nvPr>
-        </p:nvSpPr>
-        <p:spPr/>
-        <p:txBody>
-          <a:bodyPr/>
-          <a:lstStyle/>
-          <a:p>
-            <a:endParaRPr lang="pt-BR" dirty="0"/>
-          </a:p>
-        </p:txBody>
-      </p:sp>
-    </p:spTree>
-    <p:extLst>
-      <p:ext uri="{BB962C8B-B14F-4D97-AF65-F5344CB8AC3E}">
-        <p14:creationId xmlns:p14="http://schemas.microsoft.com/office/powerpoint/2010/main" val="2709569597"/>
-      </p:ext>
-    </p:extLst>
-  </p:cSld>
-  <p:clrMapOvr>
-    <a:masterClrMapping/>
-  </p:clrMapOvr>
-</p:notes>
-</file>
-
-<file path=ppt/notesSlides/notesSlide37.xml><?xml version="1.0" encoding="utf-8"?>
 <p:notes xmlns:a="http://schemas.openxmlformats.org/drawingml/2006/main" xmlns:r="http://schemas.openxmlformats.org/officeDocument/2006/relationships" xmlns:p="http://schemas.openxmlformats.org/presentationml/2006/main">
   <p:cSld>
     <p:spTree>
@@ -3078,7 +2993,7 @@
 </p:notes>
 </file>
 
-<file path=ppt/notesSlides/notesSlide38.xml><?xml version="1.0" encoding="utf-8"?>
+<file path=ppt/notesSlides/notesSlide37.xml><?xml version="1.0" encoding="utf-8"?>
 <p:notes xmlns:a="http://schemas.openxmlformats.org/drawingml/2006/main" xmlns:r="http://schemas.openxmlformats.org/officeDocument/2006/relationships" xmlns:p="http://schemas.openxmlformats.org/presentationml/2006/main">
   <p:cSld>
     <p:spTree>
@@ -9791,321 +9706,6 @@
         <p:cNvPr id="1" name="">
           <a:extLst>
             <a:ext uri="{FF2B5EF4-FFF2-40B4-BE49-F238E27FC236}">
-              <a16:creationId xmlns:a16="http://schemas.microsoft.com/office/drawing/2014/main" id="{46DAEDF2-F75D-4D20-019C-2A257300A4CE}"/>
-            </a:ext>
-          </a:extLst>
-        </p:cNvPr>
-        <p:cNvGrpSpPr/>
-        <p:nvPr/>
-      </p:nvGrpSpPr>
-      <p:grpSpPr>
-        <a:xfrm>
-          <a:off x="0" y="0"/>
-          <a:ext cx="0" cy="0"/>
-          <a:chOff x="0" y="0"/>
-          <a:chExt cx="0" cy="0"/>
-        </a:xfrm>
-      </p:grpSpPr>
-      <p:sp>
-        <p:nvSpPr>
-          <p:cNvPr id="6" name="Title 1">
-            <a:extLst>
-              <a:ext uri="{FF2B5EF4-FFF2-40B4-BE49-F238E27FC236}">
-                <a16:creationId xmlns:a16="http://schemas.microsoft.com/office/drawing/2014/main" id="{A60E9A77-8D47-C18F-B616-02F1D618B075}"/>
-              </a:ext>
-            </a:extLst>
-          </p:cNvPr>
-          <p:cNvSpPr>
-            <a:spLocks noGrp="1"/>
-          </p:cNvSpPr>
-          <p:nvPr>
-            <p:ph type="title"/>
-          </p:nvPr>
-        </p:nvSpPr>
-        <p:spPr>
-          <a:xfrm>
-            <a:off x="457200" y="205980"/>
-            <a:ext cx="8229600" cy="857251"/>
-          </a:xfrm>
-        </p:spPr>
-        <p:txBody>
-          <a:bodyPr>
-            <a:normAutofit fontScale="90000"/>
-          </a:bodyPr>
-          <a:lstStyle/>
-          <a:p>
-            <a:r>
-              <a:rPr lang="en-US" b="1" dirty="0">
-                <a:solidFill>
-                  <a:srgbClr val="0070C0"/>
-                </a:solidFill>
-              </a:rPr>
-              <a:t>CLP – AND </a:t>
-            </a:r>
-            <a:r>
-              <a:rPr lang="en-US" b="1" dirty="0" err="1">
-                <a:solidFill>
-                  <a:srgbClr val="0070C0"/>
-                </a:solidFill>
-              </a:rPr>
-              <a:t>Circuitos</a:t>
-            </a:r>
-            <a:r>
-              <a:rPr lang="en-US" b="1" dirty="0">
-                <a:solidFill>
-                  <a:srgbClr val="0070C0"/>
-                </a:solidFill>
-              </a:rPr>
-              <a:t> </a:t>
-            </a:r>
-            <a:r>
-              <a:rPr lang="en-US" b="1" dirty="0" err="1">
-                <a:solidFill>
-                  <a:srgbClr val="0070C0"/>
-                </a:solidFill>
-              </a:rPr>
-              <a:t>Combinacionais</a:t>
-            </a:r>
-            <a:endParaRPr lang="en-US" b="1" dirty="0">
-              <a:solidFill>
-                <a:srgbClr val="0070C0"/>
-              </a:solidFill>
-            </a:endParaRPr>
-          </a:p>
-        </p:txBody>
-      </p:sp>
-      <p:sp>
-        <p:nvSpPr>
-          <p:cNvPr id="8" name="Text Placeholder 2">
-            <a:extLst>
-              <a:ext uri="{FF2B5EF4-FFF2-40B4-BE49-F238E27FC236}">
-                <a16:creationId xmlns:a16="http://schemas.microsoft.com/office/drawing/2014/main" id="{30842166-E10F-4D1F-288B-783E974095EB}"/>
-              </a:ext>
-            </a:extLst>
-          </p:cNvPr>
-          <p:cNvSpPr>
-            <a:spLocks noGrp="1"/>
-          </p:cNvSpPr>
-          <p:nvPr>
-            <p:ph type="body" sz="half" idx="1"/>
-          </p:nvPr>
-        </p:nvSpPr>
-        <p:spPr>
-          <a:xfrm>
-            <a:off x="139472" y="957729"/>
-            <a:ext cx="8865056" cy="4084917"/>
-          </a:xfrm>
-        </p:spPr>
-        <p:txBody>
-          <a:bodyPr>
-            <a:noAutofit/>
-          </a:bodyPr>
-          <a:lstStyle/>
-          <a:p>
-            <a:pPr marL="0" indent="0" algn="just">
-              <a:buNone/>
-            </a:pPr>
-            <a:r>
-              <a:rPr lang="pt-BR" sz="2200" dirty="0">
-                <a:latin typeface="Times New Roman" panose="02020603050405020304" pitchFamily="18" charset="0"/>
-                <a:cs typeface="Times New Roman" panose="02020603050405020304" pitchFamily="18" charset="0"/>
-              </a:rPr>
-              <a:t>Para implementar uma </a:t>
-            </a:r>
-            <a:r>
-              <a:rPr lang="pt-BR" sz="2200" b="1" dirty="0">
-                <a:solidFill>
-                  <a:srgbClr val="FF0000"/>
-                </a:solidFill>
-                <a:latin typeface="Times New Roman" panose="02020603050405020304" pitchFamily="18" charset="0"/>
-                <a:cs typeface="Times New Roman" panose="02020603050405020304" pitchFamily="18" charset="0"/>
-              </a:rPr>
-              <a:t>lógica AND </a:t>
-            </a:r>
-            <a:r>
-              <a:rPr lang="pt-BR" sz="2200" dirty="0">
-                <a:latin typeface="Times New Roman" panose="02020603050405020304" pitchFamily="18" charset="0"/>
-                <a:cs typeface="Times New Roman" panose="02020603050405020304" pitchFamily="18" charset="0"/>
-              </a:rPr>
-              <a:t>em um diagrama </a:t>
-            </a:r>
-            <a:r>
-              <a:rPr lang="pt-BR" sz="2200" dirty="0" err="1">
-                <a:latin typeface="Times New Roman" panose="02020603050405020304" pitchFamily="18" charset="0"/>
-                <a:cs typeface="Times New Roman" panose="02020603050405020304" pitchFamily="18" charset="0"/>
-              </a:rPr>
-              <a:t>Ladder</a:t>
-            </a:r>
-            <a:r>
-              <a:rPr lang="pt-BR" sz="2200" dirty="0">
-                <a:latin typeface="Times New Roman" panose="02020603050405020304" pitchFamily="18" charset="0"/>
-                <a:cs typeface="Times New Roman" panose="02020603050405020304" pitchFamily="18" charset="0"/>
-              </a:rPr>
-              <a:t>, a ideia é usar </a:t>
-            </a:r>
-            <a:r>
-              <a:rPr lang="pt-BR" sz="2200" b="1" dirty="0">
-                <a:latin typeface="Times New Roman" panose="02020603050405020304" pitchFamily="18" charset="0"/>
-                <a:cs typeface="Times New Roman" panose="02020603050405020304" pitchFamily="18" charset="0"/>
-              </a:rPr>
-              <a:t>contatos normalmente abertos (NO)</a:t>
-            </a:r>
-            <a:r>
-              <a:rPr lang="pt-BR" sz="2200" dirty="0">
-                <a:latin typeface="Times New Roman" panose="02020603050405020304" pitchFamily="18" charset="0"/>
-                <a:cs typeface="Times New Roman" panose="02020603050405020304" pitchFamily="18" charset="0"/>
-              </a:rPr>
-              <a:t> que representem as </a:t>
-            </a:r>
-            <a:r>
-              <a:rPr lang="pt-BR" sz="2200" b="1" dirty="0">
-                <a:solidFill>
-                  <a:srgbClr val="FF0000"/>
-                </a:solidFill>
-                <a:latin typeface="Times New Roman" panose="02020603050405020304" pitchFamily="18" charset="0"/>
-                <a:cs typeface="Times New Roman" panose="02020603050405020304" pitchFamily="18" charset="0"/>
-              </a:rPr>
-              <a:t>entradas</a:t>
-            </a:r>
-            <a:r>
-              <a:rPr lang="pt-BR" sz="2200" dirty="0">
-                <a:latin typeface="Times New Roman" panose="02020603050405020304" pitchFamily="18" charset="0"/>
-                <a:cs typeface="Times New Roman" panose="02020603050405020304" pitchFamily="18" charset="0"/>
-              </a:rPr>
-              <a:t>, e conectá-los em </a:t>
-            </a:r>
-            <a:r>
-              <a:rPr lang="pt-BR" sz="2200" b="1" dirty="0">
-                <a:latin typeface="Times New Roman" panose="02020603050405020304" pitchFamily="18" charset="0"/>
-                <a:cs typeface="Times New Roman" panose="02020603050405020304" pitchFamily="18" charset="0"/>
-              </a:rPr>
-              <a:t>série</a:t>
-            </a:r>
-            <a:r>
-              <a:rPr lang="pt-BR" sz="2200" dirty="0">
-                <a:latin typeface="Times New Roman" panose="02020603050405020304" pitchFamily="18" charset="0"/>
-                <a:cs typeface="Times New Roman" panose="02020603050405020304" pitchFamily="18" charset="0"/>
-              </a:rPr>
-              <a:t>.</a:t>
-            </a:r>
-          </a:p>
-          <a:p>
-            <a:pPr marL="0" indent="0" algn="just">
-              <a:buNone/>
-            </a:pPr>
-            <a:endParaRPr lang="pt-BR" sz="2200" dirty="0">
-              <a:latin typeface="Times New Roman" panose="02020603050405020304" pitchFamily="18" charset="0"/>
-              <a:cs typeface="Times New Roman" panose="02020603050405020304" pitchFamily="18" charset="0"/>
-            </a:endParaRPr>
-          </a:p>
-          <a:p>
-            <a:pPr marL="0" indent="0" algn="just">
-              <a:buNone/>
-            </a:pPr>
-            <a:endParaRPr lang="pt-BR" sz="2200" dirty="0">
-              <a:latin typeface="Times New Roman" panose="02020603050405020304" pitchFamily="18" charset="0"/>
-              <a:cs typeface="Times New Roman" panose="02020603050405020304" pitchFamily="18" charset="0"/>
-            </a:endParaRPr>
-          </a:p>
-          <a:p>
-            <a:pPr marL="0" indent="0" algn="just">
-              <a:buNone/>
-            </a:pPr>
-            <a:r>
-              <a:rPr lang="pt-BR" sz="2200" dirty="0">
-                <a:latin typeface="Times New Roman" panose="02020603050405020304" pitchFamily="18" charset="0"/>
-                <a:cs typeface="Times New Roman" panose="02020603050405020304" pitchFamily="18" charset="0"/>
-              </a:rPr>
-              <a:t>Quando ambos os </a:t>
-            </a:r>
-            <a:r>
-              <a:rPr lang="pt-BR" sz="2200" b="1" dirty="0">
-                <a:latin typeface="Times New Roman" panose="02020603050405020304" pitchFamily="18" charset="0"/>
-                <a:cs typeface="Times New Roman" panose="02020603050405020304" pitchFamily="18" charset="0"/>
-              </a:rPr>
-              <a:t>contatos</a:t>
-            </a:r>
-            <a:r>
-              <a:rPr lang="pt-BR" sz="2200" dirty="0">
-                <a:latin typeface="Times New Roman" panose="02020603050405020304" pitchFamily="18" charset="0"/>
-                <a:cs typeface="Times New Roman" panose="02020603050405020304" pitchFamily="18" charset="0"/>
-              </a:rPr>
-              <a:t> estiverem </a:t>
-            </a:r>
-            <a:r>
-              <a:rPr lang="pt-BR" sz="2200" b="1" dirty="0">
-                <a:latin typeface="Times New Roman" panose="02020603050405020304" pitchFamily="18" charset="0"/>
-                <a:cs typeface="Times New Roman" panose="02020603050405020304" pitchFamily="18" charset="0"/>
-              </a:rPr>
-              <a:t>fechados</a:t>
-            </a:r>
-            <a:r>
-              <a:rPr lang="pt-BR" sz="2200" dirty="0">
-                <a:latin typeface="Times New Roman" panose="02020603050405020304" pitchFamily="18" charset="0"/>
-                <a:cs typeface="Times New Roman" panose="02020603050405020304" pitchFamily="18" charset="0"/>
-              </a:rPr>
-              <a:t> (ou seja, ambos as entradas A e B estiverem em nível alto: 1), a </a:t>
-            </a:r>
-            <a:r>
-              <a:rPr lang="pt-BR" sz="2200" b="1" dirty="0">
-                <a:solidFill>
-                  <a:srgbClr val="FF0000"/>
-                </a:solidFill>
-                <a:latin typeface="Times New Roman" panose="02020603050405020304" pitchFamily="18" charset="0"/>
-                <a:cs typeface="Times New Roman" panose="02020603050405020304" pitchFamily="18" charset="0"/>
-              </a:rPr>
-              <a:t>saída será ativada</a:t>
-            </a:r>
-            <a:r>
-              <a:rPr lang="pt-BR" sz="2200" dirty="0">
-                <a:latin typeface="Times New Roman" panose="02020603050405020304" pitchFamily="18" charset="0"/>
-                <a:cs typeface="Times New Roman" panose="02020603050405020304" pitchFamily="18" charset="0"/>
-              </a:rPr>
-              <a:t>.</a:t>
-            </a:r>
-          </a:p>
-          <a:p>
-            <a:pPr marL="0" indent="0" algn="just">
-              <a:buNone/>
-            </a:pPr>
-            <a:endParaRPr lang="pt-BR" sz="2200" dirty="0">
-              <a:latin typeface="Times New Roman" panose="02020603050405020304" pitchFamily="18" charset="0"/>
-              <a:cs typeface="Times New Roman" panose="02020603050405020304" pitchFamily="18" charset="0"/>
-            </a:endParaRPr>
-          </a:p>
-          <a:p>
-            <a:pPr marL="0" indent="0" algn="just">
-              <a:buNone/>
-            </a:pPr>
-            <a:endParaRPr lang="pt-BR" sz="2200" dirty="0">
-              <a:latin typeface="Times New Roman" panose="02020603050405020304" pitchFamily="18" charset="0"/>
-              <a:cs typeface="Times New Roman" panose="02020603050405020304" pitchFamily="18" charset="0"/>
-            </a:endParaRPr>
-          </a:p>
-        </p:txBody>
-      </p:sp>
-    </p:spTree>
-    <p:extLst>
-      <p:ext uri="{BB962C8B-B14F-4D97-AF65-F5344CB8AC3E}">
-        <p14:creationId xmlns:p14="http://schemas.microsoft.com/office/powerpoint/2010/main" val="2369832026"/>
-      </p:ext>
-    </p:extLst>
-  </p:cSld>
-  <p:clrMapOvr>
-    <a:masterClrMapping/>
-  </p:clrMapOvr>
-  <p:transition spd="med"/>
-</p:sld>
-</file>
-
-<file path=ppt/slides/slide22.xml><?xml version="1.0" encoding="utf-8"?>
-<p:sld xmlns:a="http://schemas.openxmlformats.org/drawingml/2006/main" xmlns:r="http://schemas.openxmlformats.org/officeDocument/2006/relationships" xmlns:p="http://schemas.openxmlformats.org/presentationml/2006/main">
-  <p:cSld>
-    <p:spTree>
-      <p:nvGrpSpPr>
-        <p:cNvPr id="1" name="">
-          <a:extLst>
-            <a:ext uri="{FF2B5EF4-FFF2-40B4-BE49-F238E27FC236}">
               <a16:creationId xmlns:a16="http://schemas.microsoft.com/office/drawing/2014/main" id="{EB761A28-B912-A720-AB13-35CA3CB7460C}"/>
             </a:ext>
           </a:extLst>
@@ -10472,7 +10072,7 @@
 </p:sld>
 </file>
 
-<file path=ppt/slides/slide23.xml><?xml version="1.0" encoding="utf-8"?>
+<file path=ppt/slides/slide22.xml><?xml version="1.0" encoding="utf-8"?>
 <p:sld xmlns:a="http://schemas.openxmlformats.org/drawingml/2006/main" xmlns:r="http://schemas.openxmlformats.org/officeDocument/2006/relationships" xmlns:p="http://schemas.openxmlformats.org/presentationml/2006/main">
   <p:cSld>
     <p:spTree>
@@ -10840,7 +10440,7 @@
 </p:sld>
 </file>
 
-<file path=ppt/slides/slide24.xml><?xml version="1.0" encoding="utf-8"?>
+<file path=ppt/slides/slide23.xml><?xml version="1.0" encoding="utf-8"?>
 <p:sld xmlns:a="http://schemas.openxmlformats.org/drawingml/2006/main" xmlns:r="http://schemas.openxmlformats.org/officeDocument/2006/relationships" xmlns:p="http://schemas.openxmlformats.org/presentationml/2006/main">
   <p:cSld>
     <p:spTree>
@@ -11162,7 +10762,7 @@
 </p:sld>
 </file>
 
-<file path=ppt/slides/slide25.xml><?xml version="1.0" encoding="utf-8"?>
+<file path=ppt/slides/slide24.xml><?xml version="1.0" encoding="utf-8"?>
 <p:sld xmlns:a="http://schemas.openxmlformats.org/drawingml/2006/main" xmlns:r="http://schemas.openxmlformats.org/officeDocument/2006/relationships" xmlns:p="http://schemas.openxmlformats.org/presentationml/2006/main">
   <p:cSld>
     <p:spTree>
@@ -11461,7 +11061,7 @@
 </p:sld>
 </file>
 
-<file path=ppt/slides/slide26.xml><?xml version="1.0" encoding="utf-8"?>
+<file path=ppt/slides/slide25.xml><?xml version="1.0" encoding="utf-8"?>
 <p:sld xmlns:a="http://schemas.openxmlformats.org/drawingml/2006/main" xmlns:r="http://schemas.openxmlformats.org/officeDocument/2006/relationships" xmlns:p="http://schemas.openxmlformats.org/presentationml/2006/main">
   <p:cSld>
     <p:spTree>
@@ -11763,7 +11363,7 @@
 </p:sld>
 </file>
 
-<file path=ppt/slides/slide27.xml><?xml version="1.0" encoding="utf-8"?>
+<file path=ppt/slides/slide26.xml><?xml version="1.0" encoding="utf-8"?>
 <p:sld xmlns:a="http://schemas.openxmlformats.org/drawingml/2006/main" xmlns:r="http://schemas.openxmlformats.org/officeDocument/2006/relationships" xmlns:p="http://schemas.openxmlformats.org/presentationml/2006/main">
   <p:cSld>
     <p:spTree>
@@ -12034,7 +11634,7 @@
 </p:sld>
 </file>
 
-<file path=ppt/slides/slide28.xml><?xml version="1.0" encoding="utf-8"?>
+<file path=ppt/slides/slide27.xml><?xml version="1.0" encoding="utf-8"?>
 <p:sld xmlns:a="http://schemas.openxmlformats.org/drawingml/2006/main" xmlns:r="http://schemas.openxmlformats.org/officeDocument/2006/relationships" xmlns:p="http://schemas.openxmlformats.org/presentationml/2006/main">
   <p:cSld>
     <p:spTree>
@@ -12264,7 +11864,7 @@
 </p:sld>
 </file>
 
-<file path=ppt/slides/slide29.xml><?xml version="1.0" encoding="utf-8"?>
+<file path=ppt/slides/slide28.xml><?xml version="1.0" encoding="utf-8"?>
 <p:sld xmlns:a="http://schemas.openxmlformats.org/drawingml/2006/main" xmlns:r="http://schemas.openxmlformats.org/officeDocument/2006/relationships" xmlns:p="http://schemas.openxmlformats.org/presentationml/2006/main">
   <p:cSld>
     <p:spTree>
@@ -12478,6 +12078,215 @@
     <p:extLst>
       <p:ext uri="{BB962C8B-B14F-4D97-AF65-F5344CB8AC3E}">
         <p14:creationId xmlns:p14="http://schemas.microsoft.com/office/powerpoint/2010/main" val="2140135422"/>
+      </p:ext>
+    </p:extLst>
+  </p:cSld>
+  <p:clrMapOvr>
+    <a:masterClrMapping/>
+  </p:clrMapOvr>
+  <p:transition spd="med"/>
+</p:sld>
+</file>
+
+<file path=ppt/slides/slide29.xml><?xml version="1.0" encoding="utf-8"?>
+<p:sld xmlns:a="http://schemas.openxmlformats.org/drawingml/2006/main" xmlns:r="http://schemas.openxmlformats.org/officeDocument/2006/relationships" xmlns:p="http://schemas.openxmlformats.org/presentationml/2006/main">
+  <p:cSld>
+    <p:spTree>
+      <p:nvGrpSpPr>
+        <p:cNvPr id="1" name="">
+          <a:extLst>
+            <a:ext uri="{FF2B5EF4-FFF2-40B4-BE49-F238E27FC236}">
+              <a16:creationId xmlns:a16="http://schemas.microsoft.com/office/drawing/2014/main" id="{E748203C-0BF3-6CEB-F2BB-E303B85D52B6}"/>
+            </a:ext>
+          </a:extLst>
+        </p:cNvPr>
+        <p:cNvGrpSpPr/>
+        <p:nvPr/>
+      </p:nvGrpSpPr>
+      <p:grpSpPr>
+        <a:xfrm>
+          <a:off x="0" y="0"/>
+          <a:ext cx="0" cy="0"/>
+          <a:chOff x="0" y="0"/>
+          <a:chExt cx="0" cy="0"/>
+        </a:xfrm>
+      </p:grpSpPr>
+      <p:sp>
+        <p:nvSpPr>
+          <p:cNvPr id="6" name="Title 1">
+            <a:extLst>
+              <a:ext uri="{FF2B5EF4-FFF2-40B4-BE49-F238E27FC236}">
+                <a16:creationId xmlns:a16="http://schemas.microsoft.com/office/drawing/2014/main" id="{FD79C601-678E-4B7C-7AFA-B990FA7103F2}"/>
+              </a:ext>
+            </a:extLst>
+          </p:cNvPr>
+          <p:cNvSpPr>
+            <a:spLocks noGrp="1"/>
+          </p:cNvSpPr>
+          <p:nvPr>
+            <p:ph type="title"/>
+          </p:nvPr>
+        </p:nvSpPr>
+        <p:spPr>
+          <a:xfrm>
+            <a:off x="457200" y="205980"/>
+            <a:ext cx="8229600" cy="857251"/>
+          </a:xfrm>
+        </p:spPr>
+        <p:txBody>
+          <a:bodyPr>
+            <a:normAutofit/>
+          </a:bodyPr>
+          <a:lstStyle/>
+          <a:p>
+            <a:r>
+              <a:rPr lang="en-US" b="1" dirty="0">
+                <a:solidFill>
+                  <a:srgbClr val="0070C0"/>
+                </a:solidFill>
+              </a:rPr>
+              <a:t>CLP – Exemplo2 </a:t>
+            </a:r>
+            <a:r>
+              <a:rPr lang="en-US" b="1" dirty="0" err="1">
+                <a:solidFill>
+                  <a:srgbClr val="0070C0"/>
+                </a:solidFill>
+              </a:rPr>
+              <a:t>Prático</a:t>
+            </a:r>
+            <a:r>
+              <a:rPr lang="en-US" b="1" dirty="0">
+                <a:solidFill>
+                  <a:srgbClr val="0070C0"/>
+                </a:solidFill>
+              </a:rPr>
+              <a:t>: Ladder</a:t>
+            </a:r>
+          </a:p>
+        </p:txBody>
+      </p:sp>
+      <p:sp>
+        <p:nvSpPr>
+          <p:cNvPr id="8" name="Text Placeholder 2">
+            <a:extLst>
+              <a:ext uri="{FF2B5EF4-FFF2-40B4-BE49-F238E27FC236}">
+                <a16:creationId xmlns:a16="http://schemas.microsoft.com/office/drawing/2014/main" id="{C8142103-0770-01F4-B02C-C70F847CDD10}"/>
+              </a:ext>
+            </a:extLst>
+          </p:cNvPr>
+          <p:cNvSpPr>
+            <a:spLocks noGrp="1"/>
+          </p:cNvSpPr>
+          <p:nvPr>
+            <p:ph type="body" sz="half" idx="1"/>
+          </p:nvPr>
+        </p:nvSpPr>
+        <p:spPr>
+          <a:xfrm>
+            <a:off x="139472" y="957730"/>
+            <a:ext cx="8865056" cy="3994150"/>
+          </a:xfrm>
+        </p:spPr>
+        <p:txBody>
+          <a:bodyPr>
+            <a:noAutofit/>
+          </a:bodyPr>
+          <a:lstStyle/>
+          <a:p>
+            <a:pPr marL="0" indent="0" algn="just">
+              <a:buNone/>
+            </a:pPr>
+            <a:r>
+              <a:rPr lang="pt-BR" sz="2000" b="1" dirty="0">
+                <a:latin typeface="Times New Roman" panose="02020603050405020304" pitchFamily="18" charset="0"/>
+                <a:cs typeface="Times New Roman" panose="02020603050405020304" pitchFamily="18" charset="0"/>
+              </a:rPr>
+              <a:t>Lógica do circuito</a:t>
+            </a:r>
+          </a:p>
+          <a:p>
+            <a:pPr marL="0" indent="0" algn="just">
+              <a:buNone/>
+            </a:pPr>
+            <a:endParaRPr lang="pt-BR" sz="2000" dirty="0">
+              <a:latin typeface="Times New Roman" panose="02020603050405020304" pitchFamily="18" charset="0"/>
+              <a:cs typeface="Times New Roman" panose="02020603050405020304" pitchFamily="18" charset="0"/>
+            </a:endParaRPr>
+          </a:p>
+          <a:p>
+            <a:pPr algn="just">
+              <a:buFont typeface="Wingdings" panose="05000000000000000000" pitchFamily="2" charset="2"/>
+              <a:buChar char="§"/>
+            </a:pPr>
+            <a:r>
+              <a:rPr lang="pt-BR" sz="2000" b="1" dirty="0" err="1">
+                <a:latin typeface="Times New Roman" panose="02020603050405020304" pitchFamily="18" charset="0"/>
+                <a:cs typeface="Times New Roman" panose="02020603050405020304" pitchFamily="18" charset="0"/>
+              </a:rPr>
+              <a:t>Combinacional</a:t>
+            </a:r>
+            <a:r>
+              <a:rPr lang="pt-BR" sz="2000" dirty="0">
+                <a:latin typeface="Times New Roman" panose="02020603050405020304" pitchFamily="18" charset="0"/>
+                <a:cs typeface="Times New Roman" panose="02020603050405020304" pitchFamily="18" charset="0"/>
+              </a:rPr>
+              <a:t>: A lâmpada acende quando o sensor detecta movimento (S1 = 1).</a:t>
+            </a:r>
+          </a:p>
+          <a:p>
+            <a:pPr algn="just">
+              <a:buFont typeface="Wingdings" panose="05000000000000000000" pitchFamily="2" charset="2"/>
+              <a:buChar char="§"/>
+            </a:pPr>
+            <a:endParaRPr lang="pt-BR" sz="2000" dirty="0">
+              <a:latin typeface="Times New Roman" panose="02020603050405020304" pitchFamily="18" charset="0"/>
+              <a:cs typeface="Times New Roman" panose="02020603050405020304" pitchFamily="18" charset="0"/>
+            </a:endParaRPr>
+          </a:p>
+          <a:p>
+            <a:pPr algn="just">
+              <a:buFont typeface="Wingdings" panose="05000000000000000000" pitchFamily="2" charset="2"/>
+              <a:buChar char="§"/>
+            </a:pPr>
+            <a:r>
+              <a:rPr lang="pt-BR" sz="2000" b="1" dirty="0" err="1">
+                <a:solidFill>
+                  <a:srgbClr val="FF0000"/>
+                </a:solidFill>
+                <a:latin typeface="Times New Roman" panose="02020603050405020304" pitchFamily="18" charset="0"/>
+                <a:cs typeface="Times New Roman" panose="02020603050405020304" pitchFamily="18" charset="0"/>
+              </a:rPr>
+              <a:t>Autorretenção</a:t>
+            </a:r>
+            <a:r>
+              <a:rPr lang="pt-BR" sz="2000" dirty="0">
+                <a:latin typeface="Times New Roman" panose="02020603050405020304" pitchFamily="18" charset="0"/>
+                <a:cs typeface="Times New Roman" panose="02020603050405020304" pitchFamily="18" charset="0"/>
+              </a:rPr>
+              <a:t>: A lâmpada permanece acesa enquanto o movimento for detectado. Se o movimento cessar, a lâmpada permanece acesa devido à </a:t>
+            </a:r>
+            <a:r>
+              <a:rPr lang="pt-BR" sz="2000" dirty="0" err="1">
+                <a:latin typeface="Times New Roman" panose="02020603050405020304" pitchFamily="18" charset="0"/>
+                <a:cs typeface="Times New Roman" panose="02020603050405020304" pitchFamily="18" charset="0"/>
+              </a:rPr>
+              <a:t>autorretenção</a:t>
+            </a:r>
+            <a:r>
+              <a:rPr lang="pt-BR" sz="2000" dirty="0">
+                <a:latin typeface="Times New Roman" panose="02020603050405020304" pitchFamily="18" charset="0"/>
+                <a:cs typeface="Times New Roman" panose="02020603050405020304" pitchFamily="18" charset="0"/>
+              </a:rPr>
+              <a:t> até que o botão de reset (S2) seja pressionado.</a:t>
+            </a:r>
+          </a:p>
+        </p:txBody>
+      </p:sp>
+    </p:spTree>
+    <p:extLst>
+      <p:ext uri="{BB962C8B-B14F-4D97-AF65-F5344CB8AC3E}">
+        <p14:creationId xmlns:p14="http://schemas.microsoft.com/office/powerpoint/2010/main" val="180132359"/>
       </p:ext>
     </p:extLst>
   </p:cSld>
@@ -12794,215 +12603,6 @@
         <p:cNvPr id="1" name="">
           <a:extLst>
             <a:ext uri="{FF2B5EF4-FFF2-40B4-BE49-F238E27FC236}">
-              <a16:creationId xmlns:a16="http://schemas.microsoft.com/office/drawing/2014/main" id="{E748203C-0BF3-6CEB-F2BB-E303B85D52B6}"/>
-            </a:ext>
-          </a:extLst>
-        </p:cNvPr>
-        <p:cNvGrpSpPr/>
-        <p:nvPr/>
-      </p:nvGrpSpPr>
-      <p:grpSpPr>
-        <a:xfrm>
-          <a:off x="0" y="0"/>
-          <a:ext cx="0" cy="0"/>
-          <a:chOff x="0" y="0"/>
-          <a:chExt cx="0" cy="0"/>
-        </a:xfrm>
-      </p:grpSpPr>
-      <p:sp>
-        <p:nvSpPr>
-          <p:cNvPr id="6" name="Title 1">
-            <a:extLst>
-              <a:ext uri="{FF2B5EF4-FFF2-40B4-BE49-F238E27FC236}">
-                <a16:creationId xmlns:a16="http://schemas.microsoft.com/office/drawing/2014/main" id="{FD79C601-678E-4B7C-7AFA-B990FA7103F2}"/>
-              </a:ext>
-            </a:extLst>
-          </p:cNvPr>
-          <p:cNvSpPr>
-            <a:spLocks noGrp="1"/>
-          </p:cNvSpPr>
-          <p:nvPr>
-            <p:ph type="title"/>
-          </p:nvPr>
-        </p:nvSpPr>
-        <p:spPr>
-          <a:xfrm>
-            <a:off x="457200" y="205980"/>
-            <a:ext cx="8229600" cy="857251"/>
-          </a:xfrm>
-        </p:spPr>
-        <p:txBody>
-          <a:bodyPr>
-            <a:normAutofit/>
-          </a:bodyPr>
-          <a:lstStyle/>
-          <a:p>
-            <a:r>
-              <a:rPr lang="en-US" b="1" dirty="0">
-                <a:solidFill>
-                  <a:srgbClr val="0070C0"/>
-                </a:solidFill>
-              </a:rPr>
-              <a:t>CLP – Exemplo2 </a:t>
-            </a:r>
-            <a:r>
-              <a:rPr lang="en-US" b="1" dirty="0" err="1">
-                <a:solidFill>
-                  <a:srgbClr val="0070C0"/>
-                </a:solidFill>
-              </a:rPr>
-              <a:t>Prático</a:t>
-            </a:r>
-            <a:r>
-              <a:rPr lang="en-US" b="1" dirty="0">
-                <a:solidFill>
-                  <a:srgbClr val="0070C0"/>
-                </a:solidFill>
-              </a:rPr>
-              <a:t>: Ladder</a:t>
-            </a:r>
-          </a:p>
-        </p:txBody>
-      </p:sp>
-      <p:sp>
-        <p:nvSpPr>
-          <p:cNvPr id="8" name="Text Placeholder 2">
-            <a:extLst>
-              <a:ext uri="{FF2B5EF4-FFF2-40B4-BE49-F238E27FC236}">
-                <a16:creationId xmlns:a16="http://schemas.microsoft.com/office/drawing/2014/main" id="{C8142103-0770-01F4-B02C-C70F847CDD10}"/>
-              </a:ext>
-            </a:extLst>
-          </p:cNvPr>
-          <p:cNvSpPr>
-            <a:spLocks noGrp="1"/>
-          </p:cNvSpPr>
-          <p:nvPr>
-            <p:ph type="body" sz="half" idx="1"/>
-          </p:nvPr>
-        </p:nvSpPr>
-        <p:spPr>
-          <a:xfrm>
-            <a:off x="139472" y="957730"/>
-            <a:ext cx="8865056" cy="3994150"/>
-          </a:xfrm>
-        </p:spPr>
-        <p:txBody>
-          <a:bodyPr>
-            <a:noAutofit/>
-          </a:bodyPr>
-          <a:lstStyle/>
-          <a:p>
-            <a:pPr marL="0" indent="0" algn="just">
-              <a:buNone/>
-            </a:pPr>
-            <a:r>
-              <a:rPr lang="pt-BR" sz="2000" b="1" dirty="0">
-                <a:latin typeface="Times New Roman" panose="02020603050405020304" pitchFamily="18" charset="0"/>
-                <a:cs typeface="Times New Roman" panose="02020603050405020304" pitchFamily="18" charset="0"/>
-              </a:rPr>
-              <a:t>Lógica do circuito</a:t>
-            </a:r>
-          </a:p>
-          <a:p>
-            <a:pPr marL="0" indent="0" algn="just">
-              <a:buNone/>
-            </a:pPr>
-            <a:endParaRPr lang="pt-BR" sz="2000" dirty="0">
-              <a:latin typeface="Times New Roman" panose="02020603050405020304" pitchFamily="18" charset="0"/>
-              <a:cs typeface="Times New Roman" panose="02020603050405020304" pitchFamily="18" charset="0"/>
-            </a:endParaRPr>
-          </a:p>
-          <a:p>
-            <a:pPr algn="just">
-              <a:buFont typeface="Wingdings" panose="05000000000000000000" pitchFamily="2" charset="2"/>
-              <a:buChar char="§"/>
-            </a:pPr>
-            <a:r>
-              <a:rPr lang="pt-BR" sz="2000" b="1" dirty="0" err="1">
-                <a:latin typeface="Times New Roman" panose="02020603050405020304" pitchFamily="18" charset="0"/>
-                <a:cs typeface="Times New Roman" panose="02020603050405020304" pitchFamily="18" charset="0"/>
-              </a:rPr>
-              <a:t>Combinacional</a:t>
-            </a:r>
-            <a:r>
-              <a:rPr lang="pt-BR" sz="2000" dirty="0">
-                <a:latin typeface="Times New Roman" panose="02020603050405020304" pitchFamily="18" charset="0"/>
-                <a:cs typeface="Times New Roman" panose="02020603050405020304" pitchFamily="18" charset="0"/>
-              </a:rPr>
-              <a:t>: A lâmpada acende quando o sensor detecta movimento (S1 = 1).</a:t>
-            </a:r>
-          </a:p>
-          <a:p>
-            <a:pPr algn="just">
-              <a:buFont typeface="Wingdings" panose="05000000000000000000" pitchFamily="2" charset="2"/>
-              <a:buChar char="§"/>
-            </a:pPr>
-            <a:endParaRPr lang="pt-BR" sz="2000" dirty="0">
-              <a:latin typeface="Times New Roman" panose="02020603050405020304" pitchFamily="18" charset="0"/>
-              <a:cs typeface="Times New Roman" panose="02020603050405020304" pitchFamily="18" charset="0"/>
-            </a:endParaRPr>
-          </a:p>
-          <a:p>
-            <a:pPr algn="just">
-              <a:buFont typeface="Wingdings" panose="05000000000000000000" pitchFamily="2" charset="2"/>
-              <a:buChar char="§"/>
-            </a:pPr>
-            <a:r>
-              <a:rPr lang="pt-BR" sz="2000" b="1" dirty="0" err="1">
-                <a:solidFill>
-                  <a:srgbClr val="FF0000"/>
-                </a:solidFill>
-                <a:latin typeface="Times New Roman" panose="02020603050405020304" pitchFamily="18" charset="0"/>
-                <a:cs typeface="Times New Roman" panose="02020603050405020304" pitchFamily="18" charset="0"/>
-              </a:rPr>
-              <a:t>Autorretenção</a:t>
-            </a:r>
-            <a:r>
-              <a:rPr lang="pt-BR" sz="2000" dirty="0">
-                <a:latin typeface="Times New Roman" panose="02020603050405020304" pitchFamily="18" charset="0"/>
-                <a:cs typeface="Times New Roman" panose="02020603050405020304" pitchFamily="18" charset="0"/>
-              </a:rPr>
-              <a:t>: A lâmpada permanece acesa enquanto o movimento for detectado. Se o movimento cessar, a lâmpada permanece acesa devido à </a:t>
-            </a:r>
-            <a:r>
-              <a:rPr lang="pt-BR" sz="2000" dirty="0" err="1">
-                <a:latin typeface="Times New Roman" panose="02020603050405020304" pitchFamily="18" charset="0"/>
-                <a:cs typeface="Times New Roman" panose="02020603050405020304" pitchFamily="18" charset="0"/>
-              </a:rPr>
-              <a:t>autorretenção</a:t>
-            </a:r>
-            <a:r>
-              <a:rPr lang="pt-BR" sz="2000" dirty="0">
-                <a:latin typeface="Times New Roman" panose="02020603050405020304" pitchFamily="18" charset="0"/>
-                <a:cs typeface="Times New Roman" panose="02020603050405020304" pitchFamily="18" charset="0"/>
-              </a:rPr>
-              <a:t> até que o botão de reset (S2) seja pressionado.</a:t>
-            </a:r>
-          </a:p>
-        </p:txBody>
-      </p:sp>
-    </p:spTree>
-    <p:extLst>
-      <p:ext uri="{BB962C8B-B14F-4D97-AF65-F5344CB8AC3E}">
-        <p14:creationId xmlns:p14="http://schemas.microsoft.com/office/powerpoint/2010/main" val="180132359"/>
-      </p:ext>
-    </p:extLst>
-  </p:cSld>
-  <p:clrMapOvr>
-    <a:masterClrMapping/>
-  </p:clrMapOvr>
-  <p:transition spd="med"/>
-</p:sld>
-</file>
-
-<file path=ppt/slides/slide31.xml><?xml version="1.0" encoding="utf-8"?>
-<p:sld xmlns:a="http://schemas.openxmlformats.org/drawingml/2006/main" xmlns:r="http://schemas.openxmlformats.org/officeDocument/2006/relationships" xmlns:p="http://schemas.openxmlformats.org/presentationml/2006/main">
-  <p:cSld>
-    <p:spTree>
-      <p:nvGrpSpPr>
-        <p:cNvPr id="1" name="">
-          <a:extLst>
-            <a:ext uri="{FF2B5EF4-FFF2-40B4-BE49-F238E27FC236}">
               <a16:creationId xmlns:a16="http://schemas.microsoft.com/office/drawing/2014/main" id="{67358460-A481-7AC3-4E34-730E284C1C45}"/>
             </a:ext>
           </a:extLst>
@@ -13241,7 +12841,7 @@
 </p:sld>
 </file>
 
-<file path=ppt/slides/slide32.xml><?xml version="1.0" encoding="utf-8"?>
+<file path=ppt/slides/slide31.xml><?xml version="1.0" encoding="utf-8"?>
 <p:sld xmlns:a="http://schemas.openxmlformats.org/drawingml/2006/main" xmlns:r="http://schemas.openxmlformats.org/officeDocument/2006/relationships" xmlns:p="http://schemas.openxmlformats.org/presentationml/2006/main">
   <p:cSld>
     <p:spTree>
@@ -13574,7 +13174,7 @@
 </p:sld>
 </file>
 
-<file path=ppt/slides/slide33.xml><?xml version="1.0" encoding="utf-8"?>
+<file path=ppt/slides/slide32.xml><?xml version="1.0" encoding="utf-8"?>
 <p:sld xmlns:a="http://schemas.openxmlformats.org/drawingml/2006/main" xmlns:r="http://schemas.openxmlformats.org/officeDocument/2006/relationships" xmlns:p="http://schemas.openxmlformats.org/presentationml/2006/main">
   <p:cSld>
     <p:spTree>
@@ -13823,7 +13423,7 @@
 </p:sld>
 </file>
 
-<file path=ppt/slides/slide34.xml><?xml version="1.0" encoding="utf-8"?>
+<file path=ppt/slides/slide33.xml><?xml version="1.0" encoding="utf-8"?>
 <p:sld xmlns:a="http://schemas.openxmlformats.org/drawingml/2006/main" xmlns:r="http://schemas.openxmlformats.org/officeDocument/2006/relationships" xmlns:p="http://schemas.openxmlformats.org/presentationml/2006/main">
   <p:cSld>
     <p:spTree>
@@ -14070,7 +13670,7 @@
 </p:sld>
 </file>
 
-<file path=ppt/slides/slide35.xml><?xml version="1.0" encoding="utf-8"?>
+<file path=ppt/slides/slide34.xml><?xml version="1.0" encoding="utf-8"?>
 <p:sld xmlns:a="http://schemas.openxmlformats.org/drawingml/2006/main" xmlns:r="http://schemas.openxmlformats.org/officeDocument/2006/relationships" xmlns:p="http://schemas.openxmlformats.org/presentationml/2006/main">
   <p:cSld>
     <p:spTree>
@@ -14376,6 +13976,173 @@
 </p:sld>
 </file>
 
+<file path=ppt/slides/slide35.xml><?xml version="1.0" encoding="utf-8"?>
+<p:sld xmlns:a="http://schemas.openxmlformats.org/drawingml/2006/main" xmlns:r="http://schemas.openxmlformats.org/officeDocument/2006/relationships" xmlns:p="http://schemas.openxmlformats.org/presentationml/2006/main">
+  <p:cSld>
+    <p:spTree>
+      <p:nvGrpSpPr>
+        <p:cNvPr id="1" name=""/>
+        <p:cNvGrpSpPr/>
+        <p:nvPr/>
+      </p:nvGrpSpPr>
+      <p:grpSpPr>
+        <a:xfrm>
+          <a:off x="0" y="0"/>
+          <a:ext cx="0" cy="0"/>
+          <a:chOff x="0" y="0"/>
+          <a:chExt cx="0" cy="0"/>
+        </a:xfrm>
+      </p:grpSpPr>
+      <p:sp>
+        <p:nvSpPr>
+          <p:cNvPr id="6" name="Title 1"/>
+          <p:cNvSpPr>
+            <a:spLocks noGrp="1"/>
+          </p:cNvSpPr>
+          <p:nvPr>
+            <p:ph type="title"/>
+          </p:nvPr>
+        </p:nvSpPr>
+        <p:spPr>
+          <a:xfrm>
+            <a:off x="457200" y="205980"/>
+            <a:ext cx="8229600" cy="857251"/>
+          </a:xfrm>
+        </p:spPr>
+        <p:txBody>
+          <a:bodyPr>
+            <a:normAutofit/>
+          </a:bodyPr>
+          <a:lstStyle/>
+          <a:p>
+            <a:r>
+              <a:rPr lang="en-US" b="1" dirty="0" err="1">
+                <a:solidFill>
+                  <a:srgbClr val="0070C0"/>
+                </a:solidFill>
+              </a:rPr>
+              <a:t>Leitura</a:t>
+            </a:r>
+            <a:r>
+              <a:rPr lang="en-US" b="1" dirty="0">
+                <a:solidFill>
+                  <a:srgbClr val="0070C0"/>
+                </a:solidFill>
+              </a:rPr>
+              <a:t> </a:t>
+            </a:r>
+            <a:r>
+              <a:rPr lang="en-US" b="1" dirty="0" err="1">
+                <a:solidFill>
+                  <a:srgbClr val="0070C0"/>
+                </a:solidFill>
+              </a:rPr>
+              <a:t>Específica</a:t>
+            </a:r>
+            <a:endParaRPr lang="en-US" b="1" dirty="0">
+              <a:solidFill>
+                <a:srgbClr val="0070C0"/>
+              </a:solidFill>
+            </a:endParaRPr>
+          </a:p>
+        </p:txBody>
+      </p:sp>
+      <p:sp>
+        <p:nvSpPr>
+          <p:cNvPr id="8" name="Text Placeholder 2"/>
+          <p:cNvSpPr>
+            <a:spLocks noGrp="1"/>
+          </p:cNvSpPr>
+          <p:nvPr>
+            <p:ph type="body" sz="half" idx="1"/>
+          </p:nvPr>
+        </p:nvSpPr>
+        <p:spPr>
+          <a:xfrm>
+            <a:off x="142865" y="1200150"/>
+            <a:ext cx="8865056" cy="3737369"/>
+          </a:xfrm>
+        </p:spPr>
+        <p:txBody>
+          <a:bodyPr>
+            <a:noAutofit/>
+          </a:bodyPr>
+          <a:lstStyle/>
+          <a:p>
+            <a:pPr marL="0" indent="0" algn="just">
+              <a:buNone/>
+            </a:pPr>
+            <a:r>
+              <a:rPr lang="pt-BR" sz="2200" dirty="0">
+                <a:latin typeface="Times New Roman" panose="02020603050405020304" pitchFamily="18" charset="0"/>
+                <a:cs typeface="Times New Roman" panose="02020603050405020304" pitchFamily="18" charset="0"/>
+              </a:rPr>
+              <a:t>[3] </a:t>
+            </a:r>
+            <a:r>
+              <a:rPr lang="pt-BR" sz="2200" b="1" dirty="0">
+                <a:latin typeface="Times New Roman" panose="02020603050405020304" pitchFamily="18" charset="0"/>
+                <a:cs typeface="Times New Roman" panose="02020603050405020304" pitchFamily="18" charset="0"/>
+              </a:rPr>
+              <a:t>Introdução às linguagens de programação para CLP</a:t>
+            </a:r>
+            <a:r>
+              <a:rPr lang="pt-BR" sz="2200" dirty="0">
+                <a:latin typeface="Times New Roman" panose="02020603050405020304" pitchFamily="18" charset="0"/>
+                <a:cs typeface="Times New Roman" panose="02020603050405020304" pitchFamily="18" charset="0"/>
+              </a:rPr>
+              <a:t>.</a:t>
+            </a:r>
+          </a:p>
+          <a:p>
+            <a:pPr marL="0" indent="0" algn="just">
+              <a:buNone/>
+            </a:pPr>
+            <a:r>
+              <a:rPr lang="pt-BR" sz="2200" b="1" dirty="0">
+                <a:solidFill>
+                  <a:srgbClr val="FF0000"/>
+                </a:solidFill>
+                <a:latin typeface="Times New Roman" panose="02020603050405020304" pitchFamily="18" charset="0"/>
+                <a:cs typeface="Times New Roman" panose="02020603050405020304" pitchFamily="18" charset="0"/>
+              </a:rPr>
+              <a:t>Disponível em:</a:t>
+            </a:r>
+          </a:p>
+          <a:p>
+            <a:pPr marL="0" indent="0" algn="just">
+              <a:buNone/>
+            </a:pPr>
+            <a:r>
+              <a:rPr lang="pt-BR" sz="2200" b="1" dirty="0">
+                <a:solidFill>
+                  <a:srgbClr val="0070C0"/>
+                </a:solidFill>
+                <a:latin typeface="Times New Roman" panose="02020603050405020304" pitchFamily="18" charset="0"/>
+                <a:cs typeface="Times New Roman" panose="02020603050405020304" pitchFamily="18" charset="0"/>
+              </a:rPr>
+              <a:t>https://books.google.com.br/books?hl=pt-BR&amp;lr=&amp;id=Ji9dDwAAQBAJ&amp;oi=fnd&amp;pg=PA17&amp;dq=CLP+%E2%80%93+Programa%C3%A7%C3%A3o+%E2%80%93+Linguagem+LADDER&amp;ots=FVYimSmuMN&amp;sig=0Goz7A3ZJnpj1ivQK49-Rig4bQA&amp;redir_esc=y#v=onepage&amp;q=CLP%20%E2%80%93%20Programa%C3%A7%C3%A3o%20%E2%80%93%20Linguagem%20LADDER&amp;f=false</a:t>
+            </a:r>
+            <a:endParaRPr lang="pt-BR" sz="2200" dirty="0">
+              <a:latin typeface="Calibri" panose="020F0502020204030204" pitchFamily="34" charset="0"/>
+            </a:endParaRPr>
+          </a:p>
+        </p:txBody>
+      </p:sp>
+    </p:spTree>
+    <p:extLst>
+      <p:ext uri="{BB962C8B-B14F-4D97-AF65-F5344CB8AC3E}">
+        <p14:creationId xmlns:p14="http://schemas.microsoft.com/office/powerpoint/2010/main" val="3680270425"/>
+      </p:ext>
+    </p:extLst>
+  </p:cSld>
+  <p:clrMapOvr>
+    <a:masterClrMapping/>
+  </p:clrMapOvr>
+  <p:transition spd="med"/>
+</p:sld>
+</file>
+
 <file path=ppt/slides/slide36.xml><?xml version="1.0" encoding="utf-8"?>
 <p:sld xmlns:a="http://schemas.openxmlformats.org/drawingml/2006/main" xmlns:r="http://schemas.openxmlformats.org/officeDocument/2006/relationships" xmlns:p="http://schemas.openxmlformats.org/presentationml/2006/main">
   <p:cSld>
@@ -14421,173 +14188,6 @@
                   <a:srgbClr val="0070C0"/>
                 </a:solidFill>
               </a:rPr>
-              <a:t>Leitura</a:t>
-            </a:r>
-            <a:r>
-              <a:rPr lang="en-US" b="1" dirty="0">
-                <a:solidFill>
-                  <a:srgbClr val="0070C0"/>
-                </a:solidFill>
-              </a:rPr>
-              <a:t> </a:t>
-            </a:r>
-            <a:r>
-              <a:rPr lang="en-US" b="1" dirty="0" err="1">
-                <a:solidFill>
-                  <a:srgbClr val="0070C0"/>
-                </a:solidFill>
-              </a:rPr>
-              <a:t>Específica</a:t>
-            </a:r>
-            <a:endParaRPr lang="en-US" b="1" dirty="0">
-              <a:solidFill>
-                <a:srgbClr val="0070C0"/>
-              </a:solidFill>
-            </a:endParaRPr>
-          </a:p>
-        </p:txBody>
-      </p:sp>
-      <p:sp>
-        <p:nvSpPr>
-          <p:cNvPr id="8" name="Text Placeholder 2"/>
-          <p:cNvSpPr>
-            <a:spLocks noGrp="1"/>
-          </p:cNvSpPr>
-          <p:nvPr>
-            <p:ph type="body" sz="half" idx="1"/>
-          </p:nvPr>
-        </p:nvSpPr>
-        <p:spPr>
-          <a:xfrm>
-            <a:off x="142865" y="1200150"/>
-            <a:ext cx="8865056" cy="3737369"/>
-          </a:xfrm>
-        </p:spPr>
-        <p:txBody>
-          <a:bodyPr>
-            <a:noAutofit/>
-          </a:bodyPr>
-          <a:lstStyle/>
-          <a:p>
-            <a:pPr marL="0" indent="0" algn="just">
-              <a:buNone/>
-            </a:pPr>
-            <a:r>
-              <a:rPr lang="pt-BR" sz="2200" dirty="0">
-                <a:latin typeface="Times New Roman" panose="02020603050405020304" pitchFamily="18" charset="0"/>
-                <a:cs typeface="Times New Roman" panose="02020603050405020304" pitchFamily="18" charset="0"/>
-              </a:rPr>
-              <a:t>[3] </a:t>
-            </a:r>
-            <a:r>
-              <a:rPr lang="pt-BR" sz="2200" b="1" dirty="0">
-                <a:latin typeface="Times New Roman" panose="02020603050405020304" pitchFamily="18" charset="0"/>
-                <a:cs typeface="Times New Roman" panose="02020603050405020304" pitchFamily="18" charset="0"/>
-              </a:rPr>
-              <a:t>Introdução às linguagens de programação para CLP</a:t>
-            </a:r>
-            <a:r>
-              <a:rPr lang="pt-BR" sz="2200" dirty="0">
-                <a:latin typeface="Times New Roman" panose="02020603050405020304" pitchFamily="18" charset="0"/>
-                <a:cs typeface="Times New Roman" panose="02020603050405020304" pitchFamily="18" charset="0"/>
-              </a:rPr>
-              <a:t>.</a:t>
-            </a:r>
-          </a:p>
-          <a:p>
-            <a:pPr marL="0" indent="0" algn="just">
-              <a:buNone/>
-            </a:pPr>
-            <a:r>
-              <a:rPr lang="pt-BR" sz="2200" b="1" dirty="0">
-                <a:solidFill>
-                  <a:srgbClr val="FF0000"/>
-                </a:solidFill>
-                <a:latin typeface="Times New Roman" panose="02020603050405020304" pitchFamily="18" charset="0"/>
-                <a:cs typeface="Times New Roman" panose="02020603050405020304" pitchFamily="18" charset="0"/>
-              </a:rPr>
-              <a:t>Disponível em:</a:t>
-            </a:r>
-          </a:p>
-          <a:p>
-            <a:pPr marL="0" indent="0" algn="just">
-              <a:buNone/>
-            </a:pPr>
-            <a:r>
-              <a:rPr lang="pt-BR" sz="2200" b="1" dirty="0">
-                <a:solidFill>
-                  <a:srgbClr val="0070C0"/>
-                </a:solidFill>
-                <a:latin typeface="Times New Roman" panose="02020603050405020304" pitchFamily="18" charset="0"/>
-                <a:cs typeface="Times New Roman" panose="02020603050405020304" pitchFamily="18" charset="0"/>
-              </a:rPr>
-              <a:t>https://books.google.com.br/books?hl=pt-BR&amp;lr=&amp;id=Ji9dDwAAQBAJ&amp;oi=fnd&amp;pg=PA17&amp;dq=CLP+%E2%80%93+Programa%C3%A7%C3%A3o+%E2%80%93+Linguagem+LADDER&amp;ots=FVYimSmuMN&amp;sig=0Goz7A3ZJnpj1ivQK49-Rig4bQA&amp;redir_esc=y#v=onepage&amp;q=CLP%20%E2%80%93%20Programa%C3%A7%C3%A3o%20%E2%80%93%20Linguagem%20LADDER&amp;f=false</a:t>
-            </a:r>
-            <a:endParaRPr lang="pt-BR" sz="2200" dirty="0">
-              <a:latin typeface="Calibri" panose="020F0502020204030204" pitchFamily="34" charset="0"/>
-            </a:endParaRPr>
-          </a:p>
-        </p:txBody>
-      </p:sp>
-    </p:spTree>
-    <p:extLst>
-      <p:ext uri="{BB962C8B-B14F-4D97-AF65-F5344CB8AC3E}">
-        <p14:creationId xmlns:p14="http://schemas.microsoft.com/office/powerpoint/2010/main" val="3680270425"/>
-      </p:ext>
-    </p:extLst>
-  </p:cSld>
-  <p:clrMapOvr>
-    <a:masterClrMapping/>
-  </p:clrMapOvr>
-  <p:transition spd="med"/>
-</p:sld>
-</file>
-
-<file path=ppt/slides/slide37.xml><?xml version="1.0" encoding="utf-8"?>
-<p:sld xmlns:a="http://schemas.openxmlformats.org/drawingml/2006/main" xmlns:r="http://schemas.openxmlformats.org/officeDocument/2006/relationships" xmlns:p="http://schemas.openxmlformats.org/presentationml/2006/main">
-  <p:cSld>
-    <p:spTree>
-      <p:nvGrpSpPr>
-        <p:cNvPr id="1" name=""/>
-        <p:cNvGrpSpPr/>
-        <p:nvPr/>
-      </p:nvGrpSpPr>
-      <p:grpSpPr>
-        <a:xfrm>
-          <a:off x="0" y="0"/>
-          <a:ext cx="0" cy="0"/>
-          <a:chOff x="0" y="0"/>
-          <a:chExt cx="0" cy="0"/>
-        </a:xfrm>
-      </p:grpSpPr>
-      <p:sp>
-        <p:nvSpPr>
-          <p:cNvPr id="6" name="Title 1"/>
-          <p:cNvSpPr>
-            <a:spLocks noGrp="1"/>
-          </p:cNvSpPr>
-          <p:nvPr>
-            <p:ph type="title"/>
-          </p:nvPr>
-        </p:nvSpPr>
-        <p:spPr>
-          <a:xfrm>
-            <a:off x="457200" y="205980"/>
-            <a:ext cx="8229600" cy="857251"/>
-          </a:xfrm>
-        </p:spPr>
-        <p:txBody>
-          <a:bodyPr>
-            <a:normAutofit/>
-          </a:bodyPr>
-          <a:lstStyle/>
-          <a:p>
-            <a:r>
-              <a:rPr lang="en-US" b="1" dirty="0" err="1">
-                <a:solidFill>
-                  <a:srgbClr val="0070C0"/>
-                </a:solidFill>
-              </a:rPr>
               <a:t>Aprenda</a:t>
             </a:r>
             <a:r>
@@ -14810,7 +14410,7 @@
 </p:sld>
 </file>
 
-<file path=ppt/slides/slide38.xml><?xml version="1.0" encoding="utf-8"?>
+<file path=ppt/slides/slide37.xml><?xml version="1.0" encoding="utf-8"?>
 <p:sld xmlns:a="http://schemas.openxmlformats.org/drawingml/2006/main" xmlns:r="http://schemas.openxmlformats.org/officeDocument/2006/relationships" xmlns:p="http://schemas.openxmlformats.org/presentationml/2006/main">
   <p:cSld>
     <p:spTree>
@@ -15280,7 +14880,7 @@
 </p:sld>
 </file>
 
-<file path=ppt/slides/slide39.xml><?xml version="1.0" encoding="utf-8"?>
+<file path=ppt/slides/slide38.xml><?xml version="1.0" encoding="utf-8"?>
 <p:sld xmlns:a="http://schemas.openxmlformats.org/drawingml/2006/main" xmlns:r="http://schemas.openxmlformats.org/officeDocument/2006/relationships" xmlns:p="http://schemas.openxmlformats.org/presentationml/2006/main">
   <p:cSld>
     <p:spTree>
@@ -15600,298 +15200,7 @@
 </p:sld>
 </file>
 
-<file path=ppt/slides/slide4.xml><?xml version="1.0" encoding="utf-8"?>
-<p:sld xmlns:a="http://schemas.openxmlformats.org/drawingml/2006/main" xmlns:r="http://schemas.openxmlformats.org/officeDocument/2006/relationships" xmlns:p="http://schemas.openxmlformats.org/presentationml/2006/main">
-  <p:cSld>
-    <p:spTree>
-      <p:nvGrpSpPr>
-        <p:cNvPr id="1" name="">
-          <a:extLst>
-            <a:ext uri="{FF2B5EF4-FFF2-40B4-BE49-F238E27FC236}">
-              <a16:creationId xmlns:a16="http://schemas.microsoft.com/office/drawing/2014/main" id="{1D1B8AD9-18B9-5943-25C6-A412CA81B6AC}"/>
-            </a:ext>
-          </a:extLst>
-        </p:cNvPr>
-        <p:cNvGrpSpPr/>
-        <p:nvPr/>
-      </p:nvGrpSpPr>
-      <p:grpSpPr>
-        <a:xfrm>
-          <a:off x="0" y="0"/>
-          <a:ext cx="0" cy="0"/>
-          <a:chOff x="0" y="0"/>
-          <a:chExt cx="0" cy="0"/>
-        </a:xfrm>
-      </p:grpSpPr>
-      <p:sp>
-        <p:nvSpPr>
-          <p:cNvPr id="6" name="Title 1">
-            <a:extLst>
-              <a:ext uri="{FF2B5EF4-FFF2-40B4-BE49-F238E27FC236}">
-                <a16:creationId xmlns:a16="http://schemas.microsoft.com/office/drawing/2014/main" id="{BBD9430F-9F74-02CD-FA90-7D0F394F9110}"/>
-              </a:ext>
-            </a:extLst>
-          </p:cNvPr>
-          <p:cNvSpPr>
-            <a:spLocks noGrp="1"/>
-          </p:cNvSpPr>
-          <p:nvPr>
-            <p:ph type="title"/>
-          </p:nvPr>
-        </p:nvSpPr>
-        <p:spPr>
-          <a:xfrm>
-            <a:off x="457200" y="205980"/>
-            <a:ext cx="8229600" cy="857251"/>
-          </a:xfrm>
-        </p:spPr>
-        <p:txBody>
-          <a:bodyPr>
-            <a:normAutofit fontScale="90000"/>
-          </a:bodyPr>
-          <a:lstStyle/>
-          <a:p>
-            <a:r>
-              <a:rPr lang="en-US" b="1" dirty="0">
-                <a:solidFill>
-                  <a:srgbClr val="0070C0"/>
-                </a:solidFill>
-              </a:rPr>
-              <a:t>CLP – </a:t>
-            </a:r>
-            <a:r>
-              <a:rPr lang="en-US" b="1" dirty="0" err="1">
-                <a:solidFill>
-                  <a:srgbClr val="0070C0"/>
-                </a:solidFill>
-              </a:rPr>
-              <a:t>Fundamentos</a:t>
-            </a:r>
-            <a:r>
-              <a:rPr lang="en-US" b="1" dirty="0">
-                <a:solidFill>
-                  <a:srgbClr val="0070C0"/>
-                </a:solidFill>
-              </a:rPr>
-              <a:t> </a:t>
-            </a:r>
-            <a:r>
-              <a:rPr lang="en-US" b="1" dirty="0" err="1">
-                <a:solidFill>
-                  <a:srgbClr val="0070C0"/>
-                </a:solidFill>
-              </a:rPr>
-              <a:t>Linguagem</a:t>
-            </a:r>
-            <a:r>
-              <a:rPr lang="en-US" b="1" dirty="0">
-                <a:solidFill>
-                  <a:srgbClr val="0070C0"/>
-                </a:solidFill>
-              </a:rPr>
-              <a:t> Ladder</a:t>
-            </a:r>
-          </a:p>
-        </p:txBody>
-      </p:sp>
-      <p:sp>
-        <p:nvSpPr>
-          <p:cNvPr id="8" name="Text Placeholder 2">
-            <a:extLst>
-              <a:ext uri="{FF2B5EF4-FFF2-40B4-BE49-F238E27FC236}">
-                <a16:creationId xmlns:a16="http://schemas.microsoft.com/office/drawing/2014/main" id="{F889CFCD-DD7B-6769-6C55-4CF57BAE988B}"/>
-              </a:ext>
-            </a:extLst>
-          </p:cNvPr>
-          <p:cNvSpPr>
-            <a:spLocks noGrp="1"/>
-          </p:cNvSpPr>
-          <p:nvPr>
-            <p:ph type="body" sz="half" idx="1"/>
-          </p:nvPr>
-        </p:nvSpPr>
-        <p:spPr>
-          <a:xfrm>
-            <a:off x="142865" y="1035050"/>
-            <a:ext cx="8865056" cy="3994150"/>
-          </a:xfrm>
-        </p:spPr>
-        <p:txBody>
-          <a:bodyPr>
-            <a:noAutofit/>
-          </a:bodyPr>
-          <a:lstStyle/>
-          <a:p>
-            <a:pPr marL="0" indent="0" algn="just">
-              <a:buNone/>
-            </a:pPr>
-            <a:r>
-              <a:rPr lang="pt-BR" sz="2000" b="1" dirty="0">
-                <a:latin typeface="Times New Roman" panose="02020603050405020304" pitchFamily="18" charset="0"/>
-                <a:cs typeface="Times New Roman" panose="02020603050405020304" pitchFamily="18" charset="0"/>
-              </a:rPr>
-              <a:t>Características</a:t>
-            </a:r>
-            <a:r>
-              <a:rPr lang="pt-BR" sz="2000" dirty="0">
-                <a:latin typeface="Times New Roman" panose="02020603050405020304" pitchFamily="18" charset="0"/>
-                <a:cs typeface="Times New Roman" panose="02020603050405020304" pitchFamily="18" charset="0"/>
-              </a:rPr>
-              <a:t>:</a:t>
-            </a:r>
-          </a:p>
-          <a:p>
-            <a:pPr marL="0" indent="0" algn="just">
-              <a:buNone/>
-            </a:pPr>
-            <a:endParaRPr lang="pt-BR" sz="2000" dirty="0">
-              <a:latin typeface="Times New Roman" panose="02020603050405020304" pitchFamily="18" charset="0"/>
-              <a:cs typeface="Times New Roman" panose="02020603050405020304" pitchFamily="18" charset="0"/>
-            </a:endParaRPr>
-          </a:p>
-          <a:p>
-            <a:pPr algn="just">
-              <a:buFont typeface="Wingdings" panose="05000000000000000000" pitchFamily="2" charset="2"/>
-              <a:buChar char="§"/>
-            </a:pPr>
-            <a:r>
-              <a:rPr lang="pt-BR" sz="2000" dirty="0">
-                <a:latin typeface="Times New Roman" panose="02020603050405020304" pitchFamily="18" charset="0"/>
-                <a:cs typeface="Times New Roman" panose="02020603050405020304" pitchFamily="18" charset="0"/>
-              </a:rPr>
-              <a:t>Assemelha-se a um </a:t>
-            </a:r>
-            <a:r>
-              <a:rPr lang="pt-BR" sz="2000" b="1" dirty="0">
-                <a:solidFill>
-                  <a:srgbClr val="FF0000"/>
-                </a:solidFill>
-                <a:latin typeface="Times New Roman" panose="02020603050405020304" pitchFamily="18" charset="0"/>
-                <a:cs typeface="Times New Roman" panose="02020603050405020304" pitchFamily="18" charset="0"/>
-              </a:rPr>
-              <a:t>diagrama de contatos elétricos</a:t>
-            </a:r>
-            <a:r>
-              <a:rPr lang="pt-BR" sz="2000" dirty="0">
-                <a:latin typeface="Times New Roman" panose="02020603050405020304" pitchFamily="18" charset="0"/>
-                <a:cs typeface="Times New Roman" panose="02020603050405020304" pitchFamily="18" charset="0"/>
-              </a:rPr>
-              <a:t>.</a:t>
-            </a:r>
-          </a:p>
-          <a:p>
-            <a:pPr marL="0" indent="0" algn="just">
-              <a:buNone/>
-            </a:pPr>
-            <a:endParaRPr lang="pt-BR" sz="2000" dirty="0">
-              <a:latin typeface="Times New Roman" panose="02020603050405020304" pitchFamily="18" charset="0"/>
-              <a:cs typeface="Times New Roman" panose="02020603050405020304" pitchFamily="18" charset="0"/>
-            </a:endParaRPr>
-          </a:p>
-          <a:p>
-            <a:pPr algn="just">
-              <a:buFont typeface="Wingdings" panose="05000000000000000000" pitchFamily="2" charset="2"/>
-              <a:buChar char="§"/>
-            </a:pPr>
-            <a:r>
-              <a:rPr lang="pt-BR" sz="2000" dirty="0">
-                <a:latin typeface="Times New Roman" panose="02020603050405020304" pitchFamily="18" charset="0"/>
-                <a:cs typeface="Times New Roman" panose="02020603050405020304" pitchFamily="18" charset="0"/>
-              </a:rPr>
-              <a:t>Facilita a programação e visualização de circuitos lógicos.</a:t>
-            </a:r>
-          </a:p>
-          <a:p>
-            <a:pPr marL="0" indent="0" algn="just">
-              <a:buNone/>
-            </a:pPr>
-            <a:endParaRPr lang="pt-BR" sz="2000" dirty="0">
-              <a:latin typeface="Times New Roman" panose="02020603050405020304" pitchFamily="18" charset="0"/>
-              <a:cs typeface="Times New Roman" panose="02020603050405020304" pitchFamily="18" charset="0"/>
-            </a:endParaRPr>
-          </a:p>
-          <a:p>
-            <a:pPr algn="just">
-              <a:buFont typeface="Wingdings" panose="05000000000000000000" pitchFamily="2" charset="2"/>
-              <a:buChar char="§"/>
-            </a:pPr>
-            <a:r>
-              <a:rPr lang="pt-BR" sz="2000" b="1" dirty="0">
-                <a:latin typeface="Times New Roman" panose="02020603050405020304" pitchFamily="18" charset="0"/>
-                <a:cs typeface="Times New Roman" panose="02020603050405020304" pitchFamily="18" charset="0"/>
-              </a:rPr>
-              <a:t>Baseada em relés</a:t>
-            </a:r>
-            <a:r>
-              <a:rPr lang="pt-BR" sz="2000" dirty="0">
-                <a:latin typeface="Times New Roman" panose="02020603050405020304" pitchFamily="18" charset="0"/>
-                <a:cs typeface="Times New Roman" panose="02020603050405020304" pitchFamily="18" charset="0"/>
-              </a:rPr>
-              <a:t>, com </a:t>
-            </a:r>
-            <a:r>
-              <a:rPr lang="pt-BR" sz="2000" b="1" dirty="0">
-                <a:solidFill>
-                  <a:srgbClr val="FF0000"/>
-                </a:solidFill>
-                <a:latin typeface="Times New Roman" panose="02020603050405020304" pitchFamily="18" charset="0"/>
-                <a:cs typeface="Times New Roman" panose="02020603050405020304" pitchFamily="18" charset="0"/>
-              </a:rPr>
-              <a:t>entradas e saídas </a:t>
-            </a:r>
-            <a:r>
-              <a:rPr lang="pt-BR" sz="2000" dirty="0">
-                <a:latin typeface="Times New Roman" panose="02020603050405020304" pitchFamily="18" charset="0"/>
-                <a:cs typeface="Times New Roman" panose="02020603050405020304" pitchFamily="18" charset="0"/>
-              </a:rPr>
-              <a:t>representadas como "</a:t>
-            </a:r>
-            <a:r>
-              <a:rPr lang="pt-BR" sz="2000" b="1" dirty="0">
-                <a:latin typeface="Times New Roman" panose="02020603050405020304" pitchFamily="18" charset="0"/>
-                <a:cs typeface="Times New Roman" panose="02020603050405020304" pitchFamily="18" charset="0"/>
-              </a:rPr>
-              <a:t>degraus</a:t>
-            </a:r>
-            <a:r>
-              <a:rPr lang="pt-BR" sz="2000" dirty="0">
-                <a:latin typeface="Times New Roman" panose="02020603050405020304" pitchFamily="18" charset="0"/>
-                <a:cs typeface="Times New Roman" panose="02020603050405020304" pitchFamily="18" charset="0"/>
-              </a:rPr>
-              <a:t>" ou "</a:t>
-            </a:r>
-            <a:r>
-              <a:rPr lang="pt-BR" sz="2000" b="1" dirty="0" err="1">
-                <a:latin typeface="Times New Roman" panose="02020603050405020304" pitchFamily="18" charset="0"/>
-                <a:cs typeface="Times New Roman" panose="02020603050405020304" pitchFamily="18" charset="0"/>
-              </a:rPr>
-              <a:t>rungs</a:t>
-            </a:r>
-            <a:r>
-              <a:rPr lang="pt-BR" sz="2000" dirty="0">
-                <a:latin typeface="Times New Roman" panose="02020603050405020304" pitchFamily="18" charset="0"/>
-                <a:cs typeface="Times New Roman" panose="02020603050405020304" pitchFamily="18" charset="0"/>
-              </a:rPr>
-              <a:t>" na escada.</a:t>
-            </a:r>
-          </a:p>
-        </p:txBody>
-      </p:sp>
-    </p:spTree>
-    <p:extLst>
-      <p:ext uri="{BB962C8B-B14F-4D97-AF65-F5344CB8AC3E}">
-        <p14:creationId xmlns:p14="http://schemas.microsoft.com/office/powerpoint/2010/main" val="3586418846"/>
-      </p:ext>
-    </p:extLst>
-  </p:cSld>
-  <p:clrMapOvr>
-    <a:masterClrMapping/>
-  </p:clrMapOvr>
-  <p:transition spd="med"/>
-</p:sld>
-</file>
-
-<file path=ppt/slides/slide40.xml><?xml version="1.0" encoding="utf-8"?>
+<file path=ppt/slides/slide39.xml><?xml version="1.0" encoding="utf-8"?>
 <p:sld xmlns:a="http://schemas.openxmlformats.org/drawingml/2006/main" xmlns:r="http://schemas.openxmlformats.org/officeDocument/2006/relationships" xmlns:p="http://schemas.openxmlformats.org/presentationml/2006/main">
   <p:cSld>
     <p:spTree>
@@ -16338,6 +15647,297 @@
         </p:spPr>
       </p:pic>
     </p:spTree>
+  </p:cSld>
+  <p:clrMapOvr>
+    <a:masterClrMapping/>
+  </p:clrMapOvr>
+  <p:transition spd="med"/>
+</p:sld>
+</file>
+
+<file path=ppt/slides/slide4.xml><?xml version="1.0" encoding="utf-8"?>
+<p:sld xmlns:a="http://schemas.openxmlformats.org/drawingml/2006/main" xmlns:r="http://schemas.openxmlformats.org/officeDocument/2006/relationships" xmlns:p="http://schemas.openxmlformats.org/presentationml/2006/main">
+  <p:cSld>
+    <p:spTree>
+      <p:nvGrpSpPr>
+        <p:cNvPr id="1" name="">
+          <a:extLst>
+            <a:ext uri="{FF2B5EF4-FFF2-40B4-BE49-F238E27FC236}">
+              <a16:creationId xmlns:a16="http://schemas.microsoft.com/office/drawing/2014/main" id="{1D1B8AD9-18B9-5943-25C6-A412CA81B6AC}"/>
+            </a:ext>
+          </a:extLst>
+        </p:cNvPr>
+        <p:cNvGrpSpPr/>
+        <p:nvPr/>
+      </p:nvGrpSpPr>
+      <p:grpSpPr>
+        <a:xfrm>
+          <a:off x="0" y="0"/>
+          <a:ext cx="0" cy="0"/>
+          <a:chOff x="0" y="0"/>
+          <a:chExt cx="0" cy="0"/>
+        </a:xfrm>
+      </p:grpSpPr>
+      <p:sp>
+        <p:nvSpPr>
+          <p:cNvPr id="6" name="Title 1">
+            <a:extLst>
+              <a:ext uri="{FF2B5EF4-FFF2-40B4-BE49-F238E27FC236}">
+                <a16:creationId xmlns:a16="http://schemas.microsoft.com/office/drawing/2014/main" id="{BBD9430F-9F74-02CD-FA90-7D0F394F9110}"/>
+              </a:ext>
+            </a:extLst>
+          </p:cNvPr>
+          <p:cNvSpPr>
+            <a:spLocks noGrp="1"/>
+          </p:cNvSpPr>
+          <p:nvPr>
+            <p:ph type="title"/>
+          </p:nvPr>
+        </p:nvSpPr>
+        <p:spPr>
+          <a:xfrm>
+            <a:off x="457200" y="205980"/>
+            <a:ext cx="8229600" cy="857251"/>
+          </a:xfrm>
+        </p:spPr>
+        <p:txBody>
+          <a:bodyPr>
+            <a:normAutofit fontScale="90000"/>
+          </a:bodyPr>
+          <a:lstStyle/>
+          <a:p>
+            <a:r>
+              <a:rPr lang="en-US" b="1" dirty="0">
+                <a:solidFill>
+                  <a:srgbClr val="0070C0"/>
+                </a:solidFill>
+              </a:rPr>
+              <a:t>CLP – </a:t>
+            </a:r>
+            <a:r>
+              <a:rPr lang="en-US" b="1" dirty="0" err="1">
+                <a:solidFill>
+                  <a:srgbClr val="0070C0"/>
+                </a:solidFill>
+              </a:rPr>
+              <a:t>Fundamentos</a:t>
+            </a:r>
+            <a:r>
+              <a:rPr lang="en-US" b="1" dirty="0">
+                <a:solidFill>
+                  <a:srgbClr val="0070C0"/>
+                </a:solidFill>
+              </a:rPr>
+              <a:t> </a:t>
+            </a:r>
+            <a:r>
+              <a:rPr lang="en-US" b="1" dirty="0" err="1">
+                <a:solidFill>
+                  <a:srgbClr val="0070C0"/>
+                </a:solidFill>
+              </a:rPr>
+              <a:t>Linguagem</a:t>
+            </a:r>
+            <a:r>
+              <a:rPr lang="en-US" b="1" dirty="0">
+                <a:solidFill>
+                  <a:srgbClr val="0070C0"/>
+                </a:solidFill>
+              </a:rPr>
+              <a:t> Ladder</a:t>
+            </a:r>
+          </a:p>
+        </p:txBody>
+      </p:sp>
+      <p:sp>
+        <p:nvSpPr>
+          <p:cNvPr id="8" name="Text Placeholder 2">
+            <a:extLst>
+              <a:ext uri="{FF2B5EF4-FFF2-40B4-BE49-F238E27FC236}">
+                <a16:creationId xmlns:a16="http://schemas.microsoft.com/office/drawing/2014/main" id="{F889CFCD-DD7B-6769-6C55-4CF57BAE988B}"/>
+              </a:ext>
+            </a:extLst>
+          </p:cNvPr>
+          <p:cNvSpPr>
+            <a:spLocks noGrp="1"/>
+          </p:cNvSpPr>
+          <p:nvPr>
+            <p:ph type="body" sz="half" idx="1"/>
+          </p:nvPr>
+        </p:nvSpPr>
+        <p:spPr>
+          <a:xfrm>
+            <a:off x="142865" y="1035050"/>
+            <a:ext cx="8865056" cy="3994150"/>
+          </a:xfrm>
+        </p:spPr>
+        <p:txBody>
+          <a:bodyPr>
+            <a:noAutofit/>
+          </a:bodyPr>
+          <a:lstStyle/>
+          <a:p>
+            <a:pPr marL="0" indent="0" algn="just">
+              <a:buNone/>
+            </a:pPr>
+            <a:r>
+              <a:rPr lang="pt-BR" sz="2000" b="1" dirty="0">
+                <a:latin typeface="Times New Roman" panose="02020603050405020304" pitchFamily="18" charset="0"/>
+                <a:cs typeface="Times New Roman" panose="02020603050405020304" pitchFamily="18" charset="0"/>
+              </a:rPr>
+              <a:t>Características</a:t>
+            </a:r>
+            <a:r>
+              <a:rPr lang="pt-BR" sz="2000" dirty="0">
+                <a:latin typeface="Times New Roman" panose="02020603050405020304" pitchFamily="18" charset="0"/>
+                <a:cs typeface="Times New Roman" panose="02020603050405020304" pitchFamily="18" charset="0"/>
+              </a:rPr>
+              <a:t>:</a:t>
+            </a:r>
+          </a:p>
+          <a:p>
+            <a:pPr marL="0" indent="0" algn="just">
+              <a:buNone/>
+            </a:pPr>
+            <a:endParaRPr lang="pt-BR" sz="2000" dirty="0">
+              <a:latin typeface="Times New Roman" panose="02020603050405020304" pitchFamily="18" charset="0"/>
+              <a:cs typeface="Times New Roman" panose="02020603050405020304" pitchFamily="18" charset="0"/>
+            </a:endParaRPr>
+          </a:p>
+          <a:p>
+            <a:pPr algn="just">
+              <a:buFont typeface="Wingdings" panose="05000000000000000000" pitchFamily="2" charset="2"/>
+              <a:buChar char="§"/>
+            </a:pPr>
+            <a:r>
+              <a:rPr lang="pt-BR" sz="2000" dirty="0">
+                <a:latin typeface="Times New Roman" panose="02020603050405020304" pitchFamily="18" charset="0"/>
+                <a:cs typeface="Times New Roman" panose="02020603050405020304" pitchFamily="18" charset="0"/>
+              </a:rPr>
+              <a:t>Assemelha-se a um </a:t>
+            </a:r>
+            <a:r>
+              <a:rPr lang="pt-BR" sz="2000" b="1" dirty="0">
+                <a:solidFill>
+                  <a:srgbClr val="FF0000"/>
+                </a:solidFill>
+                <a:latin typeface="Times New Roman" panose="02020603050405020304" pitchFamily="18" charset="0"/>
+                <a:cs typeface="Times New Roman" panose="02020603050405020304" pitchFamily="18" charset="0"/>
+              </a:rPr>
+              <a:t>diagrama de contatos elétricos</a:t>
+            </a:r>
+            <a:r>
+              <a:rPr lang="pt-BR" sz="2000" dirty="0">
+                <a:latin typeface="Times New Roman" panose="02020603050405020304" pitchFamily="18" charset="0"/>
+                <a:cs typeface="Times New Roman" panose="02020603050405020304" pitchFamily="18" charset="0"/>
+              </a:rPr>
+              <a:t>.</a:t>
+            </a:r>
+          </a:p>
+          <a:p>
+            <a:pPr marL="0" indent="0" algn="just">
+              <a:buNone/>
+            </a:pPr>
+            <a:endParaRPr lang="pt-BR" sz="2000" dirty="0">
+              <a:latin typeface="Times New Roman" panose="02020603050405020304" pitchFamily="18" charset="0"/>
+              <a:cs typeface="Times New Roman" panose="02020603050405020304" pitchFamily="18" charset="0"/>
+            </a:endParaRPr>
+          </a:p>
+          <a:p>
+            <a:pPr algn="just">
+              <a:buFont typeface="Wingdings" panose="05000000000000000000" pitchFamily="2" charset="2"/>
+              <a:buChar char="§"/>
+            </a:pPr>
+            <a:r>
+              <a:rPr lang="pt-BR" sz="2000" dirty="0">
+                <a:latin typeface="Times New Roman" panose="02020603050405020304" pitchFamily="18" charset="0"/>
+                <a:cs typeface="Times New Roman" panose="02020603050405020304" pitchFamily="18" charset="0"/>
+              </a:rPr>
+              <a:t>Facilita a programação e visualização de circuitos lógicos.</a:t>
+            </a:r>
+          </a:p>
+          <a:p>
+            <a:pPr marL="0" indent="0" algn="just">
+              <a:buNone/>
+            </a:pPr>
+            <a:endParaRPr lang="pt-BR" sz="2000" dirty="0">
+              <a:latin typeface="Times New Roman" panose="02020603050405020304" pitchFamily="18" charset="0"/>
+              <a:cs typeface="Times New Roman" panose="02020603050405020304" pitchFamily="18" charset="0"/>
+            </a:endParaRPr>
+          </a:p>
+          <a:p>
+            <a:pPr algn="just">
+              <a:buFont typeface="Wingdings" panose="05000000000000000000" pitchFamily="2" charset="2"/>
+              <a:buChar char="§"/>
+            </a:pPr>
+            <a:r>
+              <a:rPr lang="pt-BR" sz="2000" b="1" dirty="0">
+                <a:latin typeface="Times New Roman" panose="02020603050405020304" pitchFamily="18" charset="0"/>
+                <a:cs typeface="Times New Roman" panose="02020603050405020304" pitchFamily="18" charset="0"/>
+              </a:rPr>
+              <a:t>Baseada em relés</a:t>
+            </a:r>
+            <a:r>
+              <a:rPr lang="pt-BR" sz="2000" dirty="0">
+                <a:latin typeface="Times New Roman" panose="02020603050405020304" pitchFamily="18" charset="0"/>
+                <a:cs typeface="Times New Roman" panose="02020603050405020304" pitchFamily="18" charset="0"/>
+              </a:rPr>
+              <a:t>, com </a:t>
+            </a:r>
+            <a:r>
+              <a:rPr lang="pt-BR" sz="2000" b="1" dirty="0">
+                <a:solidFill>
+                  <a:srgbClr val="FF0000"/>
+                </a:solidFill>
+                <a:latin typeface="Times New Roman" panose="02020603050405020304" pitchFamily="18" charset="0"/>
+                <a:cs typeface="Times New Roman" panose="02020603050405020304" pitchFamily="18" charset="0"/>
+              </a:rPr>
+              <a:t>entradas e saídas </a:t>
+            </a:r>
+            <a:r>
+              <a:rPr lang="pt-BR" sz="2000" dirty="0">
+                <a:latin typeface="Times New Roman" panose="02020603050405020304" pitchFamily="18" charset="0"/>
+                <a:cs typeface="Times New Roman" panose="02020603050405020304" pitchFamily="18" charset="0"/>
+              </a:rPr>
+              <a:t>representadas como "</a:t>
+            </a:r>
+            <a:r>
+              <a:rPr lang="pt-BR" sz="2000" b="1" dirty="0">
+                <a:latin typeface="Times New Roman" panose="02020603050405020304" pitchFamily="18" charset="0"/>
+                <a:cs typeface="Times New Roman" panose="02020603050405020304" pitchFamily="18" charset="0"/>
+              </a:rPr>
+              <a:t>degraus</a:t>
+            </a:r>
+            <a:r>
+              <a:rPr lang="pt-BR" sz="2000" dirty="0">
+                <a:latin typeface="Times New Roman" panose="02020603050405020304" pitchFamily="18" charset="0"/>
+                <a:cs typeface="Times New Roman" panose="02020603050405020304" pitchFamily="18" charset="0"/>
+              </a:rPr>
+              <a:t>" ou "</a:t>
+            </a:r>
+            <a:r>
+              <a:rPr lang="pt-BR" sz="2000" b="1" dirty="0" err="1">
+                <a:latin typeface="Times New Roman" panose="02020603050405020304" pitchFamily="18" charset="0"/>
+                <a:cs typeface="Times New Roman" panose="02020603050405020304" pitchFamily="18" charset="0"/>
+              </a:rPr>
+              <a:t>rungs</a:t>
+            </a:r>
+            <a:r>
+              <a:rPr lang="pt-BR" sz="2000" dirty="0">
+                <a:latin typeface="Times New Roman" panose="02020603050405020304" pitchFamily="18" charset="0"/>
+                <a:cs typeface="Times New Roman" panose="02020603050405020304" pitchFamily="18" charset="0"/>
+              </a:rPr>
+              <a:t>" na escada.</a:t>
+            </a:r>
+          </a:p>
+        </p:txBody>
+      </p:sp>
+    </p:spTree>
+    <p:extLst>
+      <p:ext uri="{BB962C8B-B14F-4D97-AF65-F5344CB8AC3E}">
+        <p14:creationId xmlns:p14="http://schemas.microsoft.com/office/powerpoint/2010/main" val="3586418846"/>
+      </p:ext>
+    </p:extLst>
   </p:cSld>
   <p:clrMapOvr>
     <a:masterClrMapping/>

</xml_diff>